<commit_message>
Update the introduction and the usage manual page.
</commit_message>
<xml_diff>
--- a/doc/designDoc.pptx
+++ b/doc/designDoc.pptx
@@ -5,12 +5,14 @@
     <p:sldMasterId id="2147483648" r:id="rId1"/>
   </p:sldMasterIdLst>
   <p:notesMasterIdLst>
-    <p:notesMasterId r:id="rId5"/>
+    <p:notesMasterId r:id="rId7"/>
   </p:notesMasterIdLst>
   <p:sldIdLst>
     <p:sldId id="308" r:id="rId2"/>
     <p:sldId id="256" r:id="rId3"/>
     <p:sldId id="309" r:id="rId4"/>
+    <p:sldId id="310" r:id="rId5"/>
+    <p:sldId id="311" r:id="rId6"/>
   </p:sldIdLst>
   <p:sldSz cx="12192000" cy="6858000"/>
   <p:notesSz cx="6858000" cy="9144000"/>
@@ -6957,6 +6959,1628 @@
     <p:extLst>
       <p:ext uri="{BB962C8B-B14F-4D97-AF65-F5344CB8AC3E}">
         <p14:creationId xmlns:p14="http://schemas.microsoft.com/office/powerpoint/2010/main" val="3869360748"/>
+      </p:ext>
+    </p:extLst>
+  </p:cSld>
+  <p:clrMapOvr>
+    <a:masterClrMapping/>
+  </p:clrMapOvr>
+</p:sld>
+</file>
+
+<file path=ppt/slides/slide4.xml><?xml version="1.0" encoding="utf-8"?>
+<p:sld xmlns:a="http://schemas.openxmlformats.org/drawingml/2006/main" xmlns:r="http://schemas.openxmlformats.org/officeDocument/2006/relationships" xmlns:p="http://schemas.openxmlformats.org/presentationml/2006/main">
+  <p:cSld>
+    <p:spTree>
+      <p:nvGrpSpPr>
+        <p:cNvPr id="1" name=""/>
+        <p:cNvGrpSpPr/>
+        <p:nvPr/>
+      </p:nvGrpSpPr>
+      <p:grpSpPr>
+        <a:xfrm>
+          <a:off x="0" y="0"/>
+          <a:ext cx="0" cy="0"/>
+          <a:chOff x="0" y="0"/>
+          <a:chExt cx="0" cy="0"/>
+        </a:xfrm>
+      </p:grpSpPr>
+      <p:pic>
+        <p:nvPicPr>
+          <p:cNvPr id="5" name="Picture 4" descr="A screenshot of a computer program&#10;&#10;Description automatically generated">
+            <a:extLst>
+              <a:ext uri="{FF2B5EF4-FFF2-40B4-BE49-F238E27FC236}">
+                <a16:creationId xmlns:a16="http://schemas.microsoft.com/office/drawing/2014/main" id="{5DD7C19E-32F1-9E12-21C0-6222728331E7}"/>
+              </a:ext>
+            </a:extLst>
+          </p:cNvPr>
+          <p:cNvPicPr>
+            <a:picLocks noChangeAspect="1"/>
+          </p:cNvPicPr>
+          <p:nvPr/>
+        </p:nvPicPr>
+        <p:blipFill>
+          <a:blip r:embed="rId2">
+            <a:extLst>
+              <a:ext uri="{28A0092B-C50C-407E-A947-70E740481C1C}">
+                <a14:useLocalDpi xmlns:a14="http://schemas.microsoft.com/office/drawing/2010/main" val="0"/>
+              </a:ext>
+            </a:extLst>
+          </a:blip>
+          <a:stretch>
+            <a:fillRect/>
+          </a:stretch>
+        </p:blipFill>
+        <p:spPr>
+          <a:xfrm>
+            <a:off x="1334095" y="490905"/>
+            <a:ext cx="9523809" cy="5876190"/>
+          </a:xfrm>
+          <a:prstGeom prst="rect">
+            <a:avLst/>
+          </a:prstGeom>
+        </p:spPr>
+      </p:pic>
+      <p:cxnSp>
+        <p:nvCxnSpPr>
+          <p:cNvPr id="7" name="Straight Arrow Connector 6">
+            <a:extLst>
+              <a:ext uri="{FF2B5EF4-FFF2-40B4-BE49-F238E27FC236}">
+                <a16:creationId xmlns:a16="http://schemas.microsoft.com/office/drawing/2014/main" id="{E99AE15C-1873-B412-063A-86FF5B1F35D9}"/>
+              </a:ext>
+            </a:extLst>
+          </p:cNvPr>
+          <p:cNvCxnSpPr>
+            <a:cxnSpLocks/>
+          </p:cNvCxnSpPr>
+          <p:nvPr/>
+        </p:nvCxnSpPr>
+        <p:spPr>
+          <a:xfrm>
+            <a:off x="4416552" y="2000867"/>
+            <a:ext cx="0" cy="329184"/>
+          </a:xfrm>
+          <a:prstGeom prst="straightConnector1">
+            <a:avLst/>
+          </a:prstGeom>
+          <a:ln>
+            <a:solidFill>
+              <a:srgbClr val="FF0000"/>
+            </a:solidFill>
+            <a:tailEnd type="triangle"/>
+          </a:ln>
+        </p:spPr>
+        <p:style>
+          <a:lnRef idx="2">
+            <a:schemeClr val="accent1"/>
+          </a:lnRef>
+          <a:fillRef idx="0">
+            <a:schemeClr val="accent1"/>
+          </a:fillRef>
+          <a:effectRef idx="1">
+            <a:schemeClr val="accent1"/>
+          </a:effectRef>
+          <a:fontRef idx="minor">
+            <a:schemeClr val="tx1"/>
+          </a:fontRef>
+        </p:style>
+      </p:cxnSp>
+      <p:sp>
+        <p:nvSpPr>
+          <p:cNvPr id="11" name="Oval 10">
+            <a:extLst>
+              <a:ext uri="{FF2B5EF4-FFF2-40B4-BE49-F238E27FC236}">
+                <a16:creationId xmlns:a16="http://schemas.microsoft.com/office/drawing/2014/main" id="{98497431-ABDE-6877-8A94-98A3B88F0F94}"/>
+              </a:ext>
+            </a:extLst>
+          </p:cNvPr>
+          <p:cNvSpPr/>
+          <p:nvPr/>
+        </p:nvSpPr>
+        <p:spPr>
+          <a:xfrm>
+            <a:off x="4314582" y="1755305"/>
+            <a:ext cx="198642" cy="214127"/>
+          </a:xfrm>
+          <a:prstGeom prst="ellipse">
+            <a:avLst/>
+          </a:prstGeom>
+          <a:solidFill>
+            <a:srgbClr val="FFC000"/>
+          </a:solidFill>
+        </p:spPr>
+        <p:style>
+          <a:lnRef idx="2">
+            <a:schemeClr val="accent1">
+              <a:shade val="15000"/>
+            </a:schemeClr>
+          </a:lnRef>
+          <a:fillRef idx="1">
+            <a:schemeClr val="accent1"/>
+          </a:fillRef>
+          <a:effectRef idx="0">
+            <a:schemeClr val="accent1"/>
+          </a:effectRef>
+          <a:fontRef idx="minor">
+            <a:schemeClr val="lt1"/>
+          </a:fontRef>
+        </p:style>
+        <p:txBody>
+          <a:bodyPr rtlCol="0" anchor="ctr"/>
+          <a:lstStyle/>
+          <a:p>
+            <a:pPr algn="ctr"/>
+            <a:r>
+              <a:rPr lang="en-SG" sz="1600" b="1" dirty="0">
+                <a:solidFill>
+                  <a:srgbClr val="C00000"/>
+                </a:solidFill>
+              </a:rPr>
+              <a:t>1</a:t>
+            </a:r>
+          </a:p>
+        </p:txBody>
+      </p:sp>
+      <p:sp>
+        <p:nvSpPr>
+          <p:cNvPr id="12" name="TextBox 11">
+            <a:extLst>
+              <a:ext uri="{FF2B5EF4-FFF2-40B4-BE49-F238E27FC236}">
+                <a16:creationId xmlns:a16="http://schemas.microsoft.com/office/drawing/2014/main" id="{67BCE2AC-EC2A-2FE5-4807-01469368A41C}"/>
+              </a:ext>
+            </a:extLst>
+          </p:cNvPr>
+          <p:cNvSpPr txBox="1"/>
+          <p:nvPr/>
+        </p:nvSpPr>
+        <p:spPr>
+          <a:xfrm>
+            <a:off x="4557777" y="1723868"/>
+            <a:ext cx="3272536" cy="276999"/>
+          </a:xfrm>
+          <a:prstGeom prst="rect">
+            <a:avLst/>
+          </a:prstGeom>
+          <a:noFill/>
+        </p:spPr>
+        <p:txBody>
+          <a:bodyPr wrap="square" rtlCol="0">
+            <a:spAutoFit/>
+          </a:bodyPr>
+          <a:lstStyle/>
+          <a:p>
+            <a:pPr algn="just"/>
+            <a:r>
+              <a:rPr lang="en-US" sz="1200" b="1" dirty="0">
+                <a:solidFill>
+                  <a:srgbClr val="FF0000"/>
+                </a:solidFill>
+              </a:rPr>
+              <a:t>Select the length of appended random string</a:t>
+            </a:r>
+            <a:endParaRPr lang="en-SG" sz="1200" b="1" dirty="0">
+              <a:solidFill>
+                <a:srgbClr val="FF0000"/>
+              </a:solidFill>
+            </a:endParaRPr>
+          </a:p>
+        </p:txBody>
+      </p:sp>
+      <p:sp>
+        <p:nvSpPr>
+          <p:cNvPr id="13" name="Rectangle 12">
+            <a:extLst>
+              <a:ext uri="{FF2B5EF4-FFF2-40B4-BE49-F238E27FC236}">
+                <a16:creationId xmlns:a16="http://schemas.microsoft.com/office/drawing/2014/main" id="{F47DF115-FCB9-30ED-B248-10D5814CA67A}"/>
+              </a:ext>
+            </a:extLst>
+          </p:cNvPr>
+          <p:cNvSpPr/>
+          <p:nvPr/>
+        </p:nvSpPr>
+        <p:spPr>
+          <a:xfrm>
+            <a:off x="3082544" y="2732264"/>
+            <a:ext cx="3272536" cy="1924987"/>
+          </a:xfrm>
+          <a:prstGeom prst="rect">
+            <a:avLst/>
+          </a:prstGeom>
+          <a:noFill/>
+          <a:ln>
+            <a:solidFill>
+              <a:srgbClr val="FF0000"/>
+            </a:solidFill>
+            <a:prstDash val="sysDash"/>
+          </a:ln>
+        </p:spPr>
+        <p:style>
+          <a:lnRef idx="2">
+            <a:schemeClr val="accent1">
+              <a:shade val="15000"/>
+            </a:schemeClr>
+          </a:lnRef>
+          <a:fillRef idx="1">
+            <a:schemeClr val="accent1"/>
+          </a:fillRef>
+          <a:effectRef idx="0">
+            <a:schemeClr val="accent1"/>
+          </a:effectRef>
+          <a:fontRef idx="minor">
+            <a:schemeClr val="lt1"/>
+          </a:fontRef>
+        </p:style>
+        <p:txBody>
+          <a:bodyPr rtlCol="0" anchor="ctr"/>
+          <a:lstStyle/>
+          <a:p>
+            <a:pPr algn="ctr"/>
+            <a:endParaRPr lang="en-SG" dirty="0"/>
+          </a:p>
+        </p:txBody>
+      </p:sp>
+      <p:cxnSp>
+        <p:nvCxnSpPr>
+          <p:cNvPr id="14" name="Straight Arrow Connector 13">
+            <a:extLst>
+              <a:ext uri="{FF2B5EF4-FFF2-40B4-BE49-F238E27FC236}">
+                <a16:creationId xmlns:a16="http://schemas.microsoft.com/office/drawing/2014/main" id="{DE6DC14E-7A5A-DA52-8753-50DCB4B6A6F2}"/>
+              </a:ext>
+            </a:extLst>
+          </p:cNvPr>
+          <p:cNvCxnSpPr>
+            <a:cxnSpLocks/>
+          </p:cNvCxnSpPr>
+          <p:nvPr/>
+        </p:nvCxnSpPr>
+        <p:spPr>
+          <a:xfrm flipV="1">
+            <a:off x="3389376" y="4657251"/>
+            <a:ext cx="0" cy="342877"/>
+          </a:xfrm>
+          <a:prstGeom prst="straightConnector1">
+            <a:avLst/>
+          </a:prstGeom>
+          <a:ln>
+            <a:solidFill>
+              <a:srgbClr val="FF0000"/>
+            </a:solidFill>
+            <a:tailEnd type="triangle"/>
+          </a:ln>
+        </p:spPr>
+        <p:style>
+          <a:lnRef idx="2">
+            <a:schemeClr val="accent1"/>
+          </a:lnRef>
+          <a:fillRef idx="0">
+            <a:schemeClr val="accent1"/>
+          </a:fillRef>
+          <a:effectRef idx="1">
+            <a:schemeClr val="accent1"/>
+          </a:effectRef>
+          <a:fontRef idx="minor">
+            <a:schemeClr val="tx1"/>
+          </a:fontRef>
+        </p:style>
+      </p:cxnSp>
+      <p:sp>
+        <p:nvSpPr>
+          <p:cNvPr id="16" name="TextBox 15">
+            <a:extLst>
+              <a:ext uri="{FF2B5EF4-FFF2-40B4-BE49-F238E27FC236}">
+                <a16:creationId xmlns:a16="http://schemas.microsoft.com/office/drawing/2014/main" id="{03041EAD-BCEB-9EF3-3B06-043A182106A1}"/>
+              </a:ext>
+            </a:extLst>
+          </p:cNvPr>
+          <p:cNvSpPr txBox="1"/>
+          <p:nvPr/>
+        </p:nvSpPr>
+        <p:spPr>
+          <a:xfrm>
+            <a:off x="3439956" y="5081700"/>
+            <a:ext cx="2933412" cy="276999"/>
+          </a:xfrm>
+          <a:prstGeom prst="rect">
+            <a:avLst/>
+          </a:prstGeom>
+          <a:noFill/>
+        </p:spPr>
+        <p:txBody>
+          <a:bodyPr wrap="square" rtlCol="0">
+            <a:spAutoFit/>
+          </a:bodyPr>
+          <a:lstStyle/>
+          <a:p>
+            <a:pPr algn="just"/>
+            <a:r>
+              <a:rPr lang="en-US" sz="1200" b="1" dirty="0">
+                <a:solidFill>
+                  <a:srgbClr val="FF0000"/>
+                </a:solidFill>
+              </a:rPr>
+              <a:t>Paste the source code in the text field</a:t>
+            </a:r>
+            <a:endParaRPr lang="en-SG" sz="1200" b="1" dirty="0">
+              <a:solidFill>
+                <a:srgbClr val="FF0000"/>
+              </a:solidFill>
+            </a:endParaRPr>
+          </a:p>
+        </p:txBody>
+      </p:sp>
+      <p:sp>
+        <p:nvSpPr>
+          <p:cNvPr id="17" name="Oval 16">
+            <a:extLst>
+              <a:ext uri="{FF2B5EF4-FFF2-40B4-BE49-F238E27FC236}">
+                <a16:creationId xmlns:a16="http://schemas.microsoft.com/office/drawing/2014/main" id="{887E2DD3-06E5-E7DF-3694-973911E9B837}"/>
+              </a:ext>
+            </a:extLst>
+          </p:cNvPr>
+          <p:cNvSpPr/>
+          <p:nvPr/>
+        </p:nvSpPr>
+        <p:spPr>
+          <a:xfrm>
+            <a:off x="3290055" y="5081700"/>
+            <a:ext cx="198642" cy="214127"/>
+          </a:xfrm>
+          <a:prstGeom prst="ellipse">
+            <a:avLst/>
+          </a:prstGeom>
+          <a:solidFill>
+            <a:srgbClr val="FFC000"/>
+          </a:solidFill>
+        </p:spPr>
+        <p:style>
+          <a:lnRef idx="2">
+            <a:schemeClr val="accent1">
+              <a:shade val="15000"/>
+            </a:schemeClr>
+          </a:lnRef>
+          <a:fillRef idx="1">
+            <a:schemeClr val="accent1"/>
+          </a:fillRef>
+          <a:effectRef idx="0">
+            <a:schemeClr val="accent1"/>
+          </a:effectRef>
+          <a:fontRef idx="minor">
+            <a:schemeClr val="lt1"/>
+          </a:fontRef>
+        </p:style>
+        <p:txBody>
+          <a:bodyPr rtlCol="0" anchor="ctr"/>
+          <a:lstStyle/>
+          <a:p>
+            <a:pPr algn="ctr"/>
+            <a:r>
+              <a:rPr lang="en-US" sz="1600" b="1" dirty="0">
+                <a:solidFill>
+                  <a:srgbClr val="C00000"/>
+                </a:solidFill>
+              </a:rPr>
+              <a:t>2</a:t>
+            </a:r>
+            <a:endParaRPr lang="en-SG" sz="1600" b="1" dirty="0">
+              <a:solidFill>
+                <a:srgbClr val="C00000"/>
+              </a:solidFill>
+            </a:endParaRPr>
+          </a:p>
+        </p:txBody>
+      </p:sp>
+      <p:cxnSp>
+        <p:nvCxnSpPr>
+          <p:cNvPr id="18" name="Straight Arrow Connector 17">
+            <a:extLst>
+              <a:ext uri="{FF2B5EF4-FFF2-40B4-BE49-F238E27FC236}">
+                <a16:creationId xmlns:a16="http://schemas.microsoft.com/office/drawing/2014/main" id="{5C9237E6-BC42-9721-9AC6-5B967BBED632}"/>
+              </a:ext>
+            </a:extLst>
+          </p:cNvPr>
+          <p:cNvCxnSpPr>
+            <a:cxnSpLocks/>
+          </p:cNvCxnSpPr>
+          <p:nvPr/>
+        </p:nvCxnSpPr>
+        <p:spPr>
+          <a:xfrm flipH="1">
+            <a:off x="5364480" y="2221793"/>
+            <a:ext cx="158496" cy="172043"/>
+          </a:xfrm>
+          <a:prstGeom prst="straightConnector1">
+            <a:avLst/>
+          </a:prstGeom>
+          <a:ln>
+            <a:solidFill>
+              <a:srgbClr val="FF0000"/>
+            </a:solidFill>
+            <a:tailEnd type="triangle"/>
+          </a:ln>
+        </p:spPr>
+        <p:style>
+          <a:lnRef idx="2">
+            <a:schemeClr val="accent1"/>
+          </a:lnRef>
+          <a:fillRef idx="0">
+            <a:schemeClr val="accent1"/>
+          </a:fillRef>
+          <a:effectRef idx="1">
+            <a:schemeClr val="accent1"/>
+          </a:effectRef>
+          <a:fontRef idx="minor">
+            <a:schemeClr val="tx1"/>
+          </a:fontRef>
+        </p:style>
+      </p:cxnSp>
+      <p:sp>
+        <p:nvSpPr>
+          <p:cNvPr id="23" name="Oval 22">
+            <a:extLst>
+              <a:ext uri="{FF2B5EF4-FFF2-40B4-BE49-F238E27FC236}">
+                <a16:creationId xmlns:a16="http://schemas.microsoft.com/office/drawing/2014/main" id="{0880B563-09F9-6B3A-AD81-862FC2D76703}"/>
+              </a:ext>
+            </a:extLst>
+          </p:cNvPr>
+          <p:cNvSpPr/>
+          <p:nvPr/>
+        </p:nvSpPr>
+        <p:spPr>
+          <a:xfrm>
+            <a:off x="5570481" y="2093687"/>
+            <a:ext cx="198642" cy="214127"/>
+          </a:xfrm>
+          <a:prstGeom prst="ellipse">
+            <a:avLst/>
+          </a:prstGeom>
+          <a:solidFill>
+            <a:srgbClr val="FFC000"/>
+          </a:solidFill>
+        </p:spPr>
+        <p:style>
+          <a:lnRef idx="2">
+            <a:schemeClr val="accent1">
+              <a:shade val="15000"/>
+            </a:schemeClr>
+          </a:lnRef>
+          <a:fillRef idx="1">
+            <a:schemeClr val="accent1"/>
+          </a:fillRef>
+          <a:effectRef idx="0">
+            <a:schemeClr val="accent1"/>
+          </a:effectRef>
+          <a:fontRef idx="minor">
+            <a:schemeClr val="lt1"/>
+          </a:fontRef>
+        </p:style>
+        <p:txBody>
+          <a:bodyPr rtlCol="0" anchor="ctr"/>
+          <a:lstStyle/>
+          <a:p>
+            <a:pPr algn="ctr"/>
+            <a:r>
+              <a:rPr lang="en-US" sz="1600" b="1" dirty="0">
+                <a:solidFill>
+                  <a:srgbClr val="C00000"/>
+                </a:solidFill>
+              </a:rPr>
+              <a:t>3</a:t>
+            </a:r>
+            <a:endParaRPr lang="en-SG" sz="1600" b="1" dirty="0">
+              <a:solidFill>
+                <a:srgbClr val="C00000"/>
+              </a:solidFill>
+            </a:endParaRPr>
+          </a:p>
+        </p:txBody>
+      </p:sp>
+      <p:sp>
+        <p:nvSpPr>
+          <p:cNvPr id="24" name="TextBox 23">
+            <a:extLst>
+              <a:ext uri="{FF2B5EF4-FFF2-40B4-BE49-F238E27FC236}">
+                <a16:creationId xmlns:a16="http://schemas.microsoft.com/office/drawing/2014/main" id="{6A5181F3-BCC8-33A0-670D-A24330BB276C}"/>
+              </a:ext>
+            </a:extLst>
+          </p:cNvPr>
+          <p:cNvSpPr txBox="1"/>
+          <p:nvPr/>
+        </p:nvSpPr>
+        <p:spPr>
+          <a:xfrm>
+            <a:off x="5825882" y="2001370"/>
+            <a:ext cx="2028183" cy="276999"/>
+          </a:xfrm>
+          <a:prstGeom prst="rect">
+            <a:avLst/>
+          </a:prstGeom>
+          <a:noFill/>
+        </p:spPr>
+        <p:txBody>
+          <a:bodyPr wrap="square" rtlCol="0">
+            <a:spAutoFit/>
+          </a:bodyPr>
+          <a:lstStyle/>
+          <a:p>
+            <a:pPr algn="just"/>
+            <a:r>
+              <a:rPr lang="en-US" sz="1200" b="1" dirty="0">
+                <a:solidFill>
+                  <a:srgbClr val="FF0000"/>
+                </a:solidFill>
+              </a:rPr>
+              <a:t>Press the encode button</a:t>
+            </a:r>
+            <a:endParaRPr lang="en-SG" sz="1200" b="1" dirty="0">
+              <a:solidFill>
+                <a:srgbClr val="FF0000"/>
+              </a:solidFill>
+            </a:endParaRPr>
+          </a:p>
+        </p:txBody>
+      </p:sp>
+      <p:sp>
+        <p:nvSpPr>
+          <p:cNvPr id="25" name="Rectangle 24">
+            <a:extLst>
+              <a:ext uri="{FF2B5EF4-FFF2-40B4-BE49-F238E27FC236}">
+                <a16:creationId xmlns:a16="http://schemas.microsoft.com/office/drawing/2014/main" id="{3E916EDB-E8D2-A1C1-7A53-36EDCCDAA5B2}"/>
+              </a:ext>
+            </a:extLst>
+          </p:cNvPr>
+          <p:cNvSpPr/>
+          <p:nvPr/>
+        </p:nvSpPr>
+        <p:spPr>
+          <a:xfrm>
+            <a:off x="6855212" y="2732263"/>
+            <a:ext cx="3824979" cy="1924987"/>
+          </a:xfrm>
+          <a:prstGeom prst="rect">
+            <a:avLst/>
+          </a:prstGeom>
+          <a:noFill/>
+          <a:ln>
+            <a:solidFill>
+              <a:srgbClr val="FF0000"/>
+            </a:solidFill>
+            <a:prstDash val="sysDash"/>
+          </a:ln>
+        </p:spPr>
+        <p:style>
+          <a:lnRef idx="2">
+            <a:schemeClr val="accent1">
+              <a:shade val="15000"/>
+            </a:schemeClr>
+          </a:lnRef>
+          <a:fillRef idx="1">
+            <a:schemeClr val="accent1"/>
+          </a:fillRef>
+          <a:effectRef idx="0">
+            <a:schemeClr val="accent1"/>
+          </a:effectRef>
+          <a:fontRef idx="minor">
+            <a:schemeClr val="lt1"/>
+          </a:fontRef>
+        </p:style>
+        <p:txBody>
+          <a:bodyPr rtlCol="0" anchor="ctr"/>
+          <a:lstStyle/>
+          <a:p>
+            <a:pPr algn="ctr"/>
+            <a:endParaRPr lang="en-SG" dirty="0"/>
+          </a:p>
+        </p:txBody>
+      </p:sp>
+      <p:cxnSp>
+        <p:nvCxnSpPr>
+          <p:cNvPr id="26" name="Straight Arrow Connector 25">
+            <a:extLst>
+              <a:ext uri="{FF2B5EF4-FFF2-40B4-BE49-F238E27FC236}">
+                <a16:creationId xmlns:a16="http://schemas.microsoft.com/office/drawing/2014/main" id="{3D92EB39-96A9-EC4B-F375-72D7C68DE87E}"/>
+              </a:ext>
+            </a:extLst>
+          </p:cNvPr>
+          <p:cNvCxnSpPr>
+            <a:cxnSpLocks/>
+          </p:cNvCxnSpPr>
+          <p:nvPr/>
+        </p:nvCxnSpPr>
+        <p:spPr>
+          <a:xfrm flipV="1">
+            <a:off x="7165848" y="2644067"/>
+            <a:ext cx="0" cy="2437633"/>
+          </a:xfrm>
+          <a:prstGeom prst="straightConnector1">
+            <a:avLst/>
+          </a:prstGeom>
+          <a:ln>
+            <a:solidFill>
+              <a:srgbClr val="FF0000"/>
+            </a:solidFill>
+            <a:tailEnd type="triangle"/>
+          </a:ln>
+        </p:spPr>
+        <p:style>
+          <a:lnRef idx="2">
+            <a:schemeClr val="accent1"/>
+          </a:lnRef>
+          <a:fillRef idx="0">
+            <a:schemeClr val="accent1"/>
+          </a:fillRef>
+          <a:effectRef idx="1">
+            <a:schemeClr val="accent1"/>
+          </a:effectRef>
+          <a:fontRef idx="minor">
+            <a:schemeClr val="tx1"/>
+          </a:fontRef>
+        </p:style>
+      </p:cxnSp>
+      <p:cxnSp>
+        <p:nvCxnSpPr>
+          <p:cNvPr id="29" name="Straight Arrow Connector 28">
+            <a:extLst>
+              <a:ext uri="{FF2B5EF4-FFF2-40B4-BE49-F238E27FC236}">
+                <a16:creationId xmlns:a16="http://schemas.microsoft.com/office/drawing/2014/main" id="{20643C38-9ECE-7A56-558B-AF803C818967}"/>
+              </a:ext>
+            </a:extLst>
+          </p:cNvPr>
+          <p:cNvCxnSpPr>
+            <a:cxnSpLocks/>
+          </p:cNvCxnSpPr>
+          <p:nvPr/>
+        </p:nvCxnSpPr>
+        <p:spPr>
+          <a:xfrm flipV="1">
+            <a:off x="7299960" y="4729772"/>
+            <a:ext cx="0" cy="351928"/>
+          </a:xfrm>
+          <a:prstGeom prst="straightConnector1">
+            <a:avLst/>
+          </a:prstGeom>
+          <a:ln>
+            <a:solidFill>
+              <a:srgbClr val="FF0000"/>
+            </a:solidFill>
+            <a:tailEnd type="triangle"/>
+          </a:ln>
+        </p:spPr>
+        <p:style>
+          <a:lnRef idx="2">
+            <a:schemeClr val="accent1"/>
+          </a:lnRef>
+          <a:fillRef idx="0">
+            <a:schemeClr val="accent1"/>
+          </a:fillRef>
+          <a:effectRef idx="1">
+            <a:schemeClr val="accent1"/>
+          </a:effectRef>
+          <a:fontRef idx="minor">
+            <a:schemeClr val="tx1"/>
+          </a:fontRef>
+        </p:style>
+      </p:cxnSp>
+      <p:sp>
+        <p:nvSpPr>
+          <p:cNvPr id="33" name="Oval 32">
+            <a:extLst>
+              <a:ext uri="{FF2B5EF4-FFF2-40B4-BE49-F238E27FC236}">
+                <a16:creationId xmlns:a16="http://schemas.microsoft.com/office/drawing/2014/main" id="{32987306-79B3-BFB4-CF17-6D6959948F06}"/>
+              </a:ext>
+            </a:extLst>
+          </p:cNvPr>
+          <p:cNvSpPr/>
+          <p:nvPr/>
+        </p:nvSpPr>
+        <p:spPr>
+          <a:xfrm>
+            <a:off x="7133584" y="5079808"/>
+            <a:ext cx="198642" cy="214127"/>
+          </a:xfrm>
+          <a:prstGeom prst="ellipse">
+            <a:avLst/>
+          </a:prstGeom>
+          <a:solidFill>
+            <a:srgbClr val="FFC000"/>
+          </a:solidFill>
+        </p:spPr>
+        <p:style>
+          <a:lnRef idx="2">
+            <a:schemeClr val="accent1">
+              <a:shade val="15000"/>
+            </a:schemeClr>
+          </a:lnRef>
+          <a:fillRef idx="1">
+            <a:schemeClr val="accent1"/>
+          </a:fillRef>
+          <a:effectRef idx="0">
+            <a:schemeClr val="accent1"/>
+          </a:effectRef>
+          <a:fontRef idx="minor">
+            <a:schemeClr val="lt1"/>
+          </a:fontRef>
+        </p:style>
+        <p:txBody>
+          <a:bodyPr rtlCol="0" anchor="ctr"/>
+          <a:lstStyle/>
+          <a:p>
+            <a:pPr algn="ctr"/>
+            <a:r>
+              <a:rPr lang="en-US" sz="1600" b="1" dirty="0">
+                <a:solidFill>
+                  <a:srgbClr val="C00000"/>
+                </a:solidFill>
+              </a:rPr>
+              <a:t>4</a:t>
+            </a:r>
+            <a:endParaRPr lang="en-SG" sz="1600" b="1" dirty="0">
+              <a:solidFill>
+                <a:srgbClr val="C00000"/>
+              </a:solidFill>
+            </a:endParaRPr>
+          </a:p>
+        </p:txBody>
+      </p:sp>
+      <p:sp>
+        <p:nvSpPr>
+          <p:cNvPr id="34" name="TextBox 33">
+            <a:extLst>
+              <a:ext uri="{FF2B5EF4-FFF2-40B4-BE49-F238E27FC236}">
+                <a16:creationId xmlns:a16="http://schemas.microsoft.com/office/drawing/2014/main" id="{CDDB1AEE-0F89-6C9B-0EAD-2EA7E2812340}"/>
+              </a:ext>
+            </a:extLst>
+          </p:cNvPr>
+          <p:cNvSpPr txBox="1"/>
+          <p:nvPr/>
+        </p:nvSpPr>
+        <p:spPr>
+          <a:xfrm>
+            <a:off x="7299960" y="4905936"/>
+            <a:ext cx="2933412" cy="461665"/>
+          </a:xfrm>
+          <a:prstGeom prst="rect">
+            <a:avLst/>
+          </a:prstGeom>
+          <a:noFill/>
+        </p:spPr>
+        <p:txBody>
+          <a:bodyPr wrap="square" rtlCol="0">
+            <a:spAutoFit/>
+          </a:bodyPr>
+          <a:lstStyle/>
+          <a:p>
+            <a:pPr algn="just"/>
+            <a:r>
+              <a:rPr lang="en-US" sz="1200" b="1" dirty="0">
+                <a:solidFill>
+                  <a:srgbClr val="FF0000"/>
+                </a:solidFill>
+              </a:rPr>
+              <a:t>Copy the obfuscated code or press the copy to clipboard button</a:t>
+            </a:r>
+            <a:endParaRPr lang="en-SG" sz="1200" b="1" dirty="0">
+              <a:solidFill>
+                <a:srgbClr val="FF0000"/>
+              </a:solidFill>
+            </a:endParaRPr>
+          </a:p>
+        </p:txBody>
+      </p:sp>
+    </p:spTree>
+    <p:extLst>
+      <p:ext uri="{BB962C8B-B14F-4D97-AF65-F5344CB8AC3E}">
+        <p14:creationId xmlns:p14="http://schemas.microsoft.com/office/powerpoint/2010/main" val="2503830549"/>
+      </p:ext>
+    </p:extLst>
+  </p:cSld>
+  <p:clrMapOvr>
+    <a:masterClrMapping/>
+  </p:clrMapOvr>
+</p:sld>
+</file>
+
+<file path=ppt/slides/slide5.xml><?xml version="1.0" encoding="utf-8"?>
+<p:sld xmlns:a="http://schemas.openxmlformats.org/drawingml/2006/main" xmlns:r="http://schemas.openxmlformats.org/officeDocument/2006/relationships" xmlns:p="http://schemas.openxmlformats.org/presentationml/2006/main">
+  <p:cSld>
+    <p:spTree>
+      <p:nvGrpSpPr>
+        <p:cNvPr id="1" name=""/>
+        <p:cNvGrpSpPr/>
+        <p:nvPr/>
+      </p:nvGrpSpPr>
+      <p:grpSpPr>
+        <a:xfrm>
+          <a:off x="0" y="0"/>
+          <a:ext cx="0" cy="0"/>
+          <a:chOff x="0" y="0"/>
+          <a:chExt cx="0" cy="0"/>
+        </a:xfrm>
+      </p:grpSpPr>
+      <p:pic>
+        <p:nvPicPr>
+          <p:cNvPr id="5" name="Picture 4" descr="A screenshot of a computer program&#10;&#10;Description automatically generated">
+            <a:extLst>
+              <a:ext uri="{FF2B5EF4-FFF2-40B4-BE49-F238E27FC236}">
+                <a16:creationId xmlns:a16="http://schemas.microsoft.com/office/drawing/2014/main" id="{2C5EAB1C-278E-A8DD-D960-69A1D45DD2DE}"/>
+              </a:ext>
+            </a:extLst>
+          </p:cNvPr>
+          <p:cNvPicPr>
+            <a:picLocks noChangeAspect="1"/>
+          </p:cNvPicPr>
+          <p:nvPr/>
+        </p:nvPicPr>
+        <p:blipFill>
+          <a:blip r:embed="rId2">
+            <a:extLst>
+              <a:ext uri="{28A0092B-C50C-407E-A947-70E740481C1C}">
+                <a14:useLocalDpi xmlns:a14="http://schemas.microsoft.com/office/drawing/2010/main" val="0"/>
+              </a:ext>
+            </a:extLst>
+          </a:blip>
+          <a:stretch>
+            <a:fillRect/>
+          </a:stretch>
+        </p:blipFill>
+        <p:spPr>
+          <a:xfrm>
+            <a:off x="1334095" y="490905"/>
+            <a:ext cx="9523809" cy="5876190"/>
+          </a:xfrm>
+          <a:prstGeom prst="rect">
+            <a:avLst/>
+          </a:prstGeom>
+        </p:spPr>
+      </p:pic>
+      <p:cxnSp>
+        <p:nvCxnSpPr>
+          <p:cNvPr id="6" name="Straight Arrow Connector 5">
+            <a:extLst>
+              <a:ext uri="{FF2B5EF4-FFF2-40B4-BE49-F238E27FC236}">
+                <a16:creationId xmlns:a16="http://schemas.microsoft.com/office/drawing/2014/main" id="{56FF8BC0-597F-E72F-9298-B8806A1302B9}"/>
+              </a:ext>
+            </a:extLst>
+          </p:cNvPr>
+          <p:cNvCxnSpPr>
+            <a:cxnSpLocks/>
+          </p:cNvCxnSpPr>
+          <p:nvPr/>
+        </p:nvCxnSpPr>
+        <p:spPr>
+          <a:xfrm flipV="1">
+            <a:off x="3735417" y="4282751"/>
+            <a:ext cx="0" cy="329174"/>
+          </a:xfrm>
+          <a:prstGeom prst="straightConnector1">
+            <a:avLst/>
+          </a:prstGeom>
+          <a:ln>
+            <a:solidFill>
+              <a:srgbClr val="FF0000"/>
+            </a:solidFill>
+            <a:tailEnd type="triangle"/>
+          </a:ln>
+        </p:spPr>
+        <p:style>
+          <a:lnRef idx="2">
+            <a:schemeClr val="accent1"/>
+          </a:lnRef>
+          <a:fillRef idx="0">
+            <a:schemeClr val="accent1"/>
+          </a:fillRef>
+          <a:effectRef idx="1">
+            <a:schemeClr val="accent1"/>
+          </a:effectRef>
+          <a:fontRef idx="minor">
+            <a:schemeClr val="tx1"/>
+          </a:fontRef>
+        </p:style>
+      </p:cxnSp>
+      <p:sp>
+        <p:nvSpPr>
+          <p:cNvPr id="7" name="Oval 6">
+            <a:extLst>
+              <a:ext uri="{FF2B5EF4-FFF2-40B4-BE49-F238E27FC236}">
+                <a16:creationId xmlns:a16="http://schemas.microsoft.com/office/drawing/2014/main" id="{A63ED2EE-D5E1-19EE-1DEC-5C0D683382E6}"/>
+              </a:ext>
+            </a:extLst>
+          </p:cNvPr>
+          <p:cNvSpPr/>
+          <p:nvPr/>
+        </p:nvSpPr>
+        <p:spPr>
+          <a:xfrm>
+            <a:off x="3636096" y="4611925"/>
+            <a:ext cx="198642" cy="214127"/>
+          </a:xfrm>
+          <a:prstGeom prst="ellipse">
+            <a:avLst/>
+          </a:prstGeom>
+          <a:solidFill>
+            <a:srgbClr val="FFC000"/>
+          </a:solidFill>
+        </p:spPr>
+        <p:style>
+          <a:lnRef idx="2">
+            <a:schemeClr val="accent1">
+              <a:shade val="15000"/>
+            </a:schemeClr>
+          </a:lnRef>
+          <a:fillRef idx="1">
+            <a:schemeClr val="accent1"/>
+          </a:fillRef>
+          <a:effectRef idx="0">
+            <a:schemeClr val="accent1"/>
+          </a:effectRef>
+          <a:fontRef idx="minor">
+            <a:schemeClr val="lt1"/>
+          </a:fontRef>
+        </p:style>
+        <p:txBody>
+          <a:bodyPr rtlCol="0" anchor="ctr"/>
+          <a:lstStyle/>
+          <a:p>
+            <a:pPr algn="ctr"/>
+            <a:r>
+              <a:rPr lang="en-SG" sz="1600" b="1" dirty="0">
+                <a:solidFill>
+                  <a:srgbClr val="C00000"/>
+                </a:solidFill>
+              </a:rPr>
+              <a:t>1</a:t>
+            </a:r>
+          </a:p>
+        </p:txBody>
+      </p:sp>
+      <p:sp>
+        <p:nvSpPr>
+          <p:cNvPr id="8" name="Rectangle 7">
+            <a:extLst>
+              <a:ext uri="{FF2B5EF4-FFF2-40B4-BE49-F238E27FC236}">
+                <a16:creationId xmlns:a16="http://schemas.microsoft.com/office/drawing/2014/main" id="{44CB0BC7-1EC6-447F-9FEE-5C00C04AD046}"/>
+              </a:ext>
+            </a:extLst>
+          </p:cNvPr>
+          <p:cNvSpPr/>
+          <p:nvPr/>
+        </p:nvSpPr>
+        <p:spPr>
+          <a:xfrm>
+            <a:off x="3082543" y="2677886"/>
+            <a:ext cx="3654153" cy="1604865"/>
+          </a:xfrm>
+          <a:prstGeom prst="rect">
+            <a:avLst/>
+          </a:prstGeom>
+          <a:noFill/>
+          <a:ln>
+            <a:solidFill>
+              <a:srgbClr val="FF0000"/>
+            </a:solidFill>
+            <a:prstDash val="sysDash"/>
+          </a:ln>
+        </p:spPr>
+        <p:style>
+          <a:lnRef idx="2">
+            <a:schemeClr val="accent1">
+              <a:shade val="15000"/>
+            </a:schemeClr>
+          </a:lnRef>
+          <a:fillRef idx="1">
+            <a:schemeClr val="accent1"/>
+          </a:fillRef>
+          <a:effectRef idx="0">
+            <a:schemeClr val="accent1"/>
+          </a:effectRef>
+          <a:fontRef idx="minor">
+            <a:schemeClr val="lt1"/>
+          </a:fontRef>
+        </p:style>
+        <p:txBody>
+          <a:bodyPr rtlCol="0" anchor="ctr"/>
+          <a:lstStyle/>
+          <a:p>
+            <a:pPr algn="ctr"/>
+            <a:endParaRPr lang="en-SG" dirty="0"/>
+          </a:p>
+        </p:txBody>
+      </p:sp>
+      <p:sp>
+        <p:nvSpPr>
+          <p:cNvPr id="10" name="TextBox 9">
+            <a:extLst>
+              <a:ext uri="{FF2B5EF4-FFF2-40B4-BE49-F238E27FC236}">
+                <a16:creationId xmlns:a16="http://schemas.microsoft.com/office/drawing/2014/main" id="{ED413C2D-E169-1800-5708-132391994FE4}"/>
+              </a:ext>
+            </a:extLst>
+          </p:cNvPr>
+          <p:cNvSpPr txBox="1"/>
+          <p:nvPr/>
+        </p:nvSpPr>
+        <p:spPr>
+          <a:xfrm>
+            <a:off x="3934059" y="4580488"/>
+            <a:ext cx="2410756" cy="461665"/>
+          </a:xfrm>
+          <a:prstGeom prst="rect">
+            <a:avLst/>
+          </a:prstGeom>
+          <a:noFill/>
+        </p:spPr>
+        <p:txBody>
+          <a:bodyPr wrap="square" rtlCol="0">
+            <a:spAutoFit/>
+          </a:bodyPr>
+          <a:lstStyle/>
+          <a:p>
+            <a:pPr algn="just"/>
+            <a:r>
+              <a:rPr lang="en-US" sz="1200" b="1" dirty="0">
+                <a:solidFill>
+                  <a:srgbClr val="FF0000"/>
+                </a:solidFill>
+              </a:rPr>
+              <a:t>Paste the obfuscated bytes data in the text field</a:t>
+            </a:r>
+            <a:endParaRPr lang="en-SG" sz="1200" b="1" dirty="0">
+              <a:solidFill>
+                <a:srgbClr val="FF0000"/>
+              </a:solidFill>
+            </a:endParaRPr>
+          </a:p>
+        </p:txBody>
+      </p:sp>
+      <p:cxnSp>
+        <p:nvCxnSpPr>
+          <p:cNvPr id="11" name="Straight Arrow Connector 10">
+            <a:extLst>
+              <a:ext uri="{FF2B5EF4-FFF2-40B4-BE49-F238E27FC236}">
+                <a16:creationId xmlns:a16="http://schemas.microsoft.com/office/drawing/2014/main" id="{0C6C3318-5ACD-F959-99F4-0073B61F6B8B}"/>
+              </a:ext>
+            </a:extLst>
+          </p:cNvPr>
+          <p:cNvCxnSpPr>
+            <a:cxnSpLocks/>
+          </p:cNvCxnSpPr>
+          <p:nvPr/>
+        </p:nvCxnSpPr>
+        <p:spPr>
+          <a:xfrm flipH="1">
+            <a:off x="3162934" y="2108718"/>
+            <a:ext cx="771125" cy="326571"/>
+          </a:xfrm>
+          <a:prstGeom prst="straightConnector1">
+            <a:avLst/>
+          </a:prstGeom>
+          <a:ln>
+            <a:solidFill>
+              <a:srgbClr val="FF0000"/>
+            </a:solidFill>
+            <a:tailEnd type="triangle"/>
+          </a:ln>
+        </p:spPr>
+        <p:style>
+          <a:lnRef idx="2">
+            <a:schemeClr val="accent1"/>
+          </a:lnRef>
+          <a:fillRef idx="0">
+            <a:schemeClr val="accent1"/>
+          </a:fillRef>
+          <a:effectRef idx="1">
+            <a:schemeClr val="accent1"/>
+          </a:effectRef>
+          <a:fontRef idx="minor">
+            <a:schemeClr val="tx1"/>
+          </a:fontRef>
+        </p:style>
+      </p:cxnSp>
+      <p:sp>
+        <p:nvSpPr>
+          <p:cNvPr id="16" name="Oval 15">
+            <a:extLst>
+              <a:ext uri="{FF2B5EF4-FFF2-40B4-BE49-F238E27FC236}">
+                <a16:creationId xmlns:a16="http://schemas.microsoft.com/office/drawing/2014/main" id="{C6D136AF-A0F3-EB3B-9C74-B458DA23AC8B}"/>
+              </a:ext>
+            </a:extLst>
+          </p:cNvPr>
+          <p:cNvSpPr/>
+          <p:nvPr/>
+        </p:nvSpPr>
+        <p:spPr>
+          <a:xfrm>
+            <a:off x="3975106" y="2032009"/>
+            <a:ext cx="198642" cy="214127"/>
+          </a:xfrm>
+          <a:prstGeom prst="ellipse">
+            <a:avLst/>
+          </a:prstGeom>
+          <a:solidFill>
+            <a:srgbClr val="FFC000"/>
+          </a:solidFill>
+        </p:spPr>
+        <p:style>
+          <a:lnRef idx="2">
+            <a:schemeClr val="accent1">
+              <a:shade val="15000"/>
+            </a:schemeClr>
+          </a:lnRef>
+          <a:fillRef idx="1">
+            <a:schemeClr val="accent1"/>
+          </a:fillRef>
+          <a:effectRef idx="0">
+            <a:schemeClr val="accent1"/>
+          </a:effectRef>
+          <a:fontRef idx="minor">
+            <a:schemeClr val="lt1"/>
+          </a:fontRef>
+        </p:style>
+        <p:txBody>
+          <a:bodyPr rtlCol="0" anchor="ctr"/>
+          <a:lstStyle/>
+          <a:p>
+            <a:pPr algn="ctr"/>
+            <a:r>
+              <a:rPr lang="en-US" sz="1600" b="1" dirty="0">
+                <a:solidFill>
+                  <a:srgbClr val="C00000"/>
+                </a:solidFill>
+              </a:rPr>
+              <a:t>2</a:t>
+            </a:r>
+            <a:endParaRPr lang="en-SG" sz="1600" b="1" dirty="0">
+              <a:solidFill>
+                <a:srgbClr val="C00000"/>
+              </a:solidFill>
+            </a:endParaRPr>
+          </a:p>
+        </p:txBody>
+      </p:sp>
+      <p:sp>
+        <p:nvSpPr>
+          <p:cNvPr id="17" name="TextBox 16">
+            <a:extLst>
+              <a:ext uri="{FF2B5EF4-FFF2-40B4-BE49-F238E27FC236}">
+                <a16:creationId xmlns:a16="http://schemas.microsoft.com/office/drawing/2014/main" id="{1CA33739-EC3B-FF4B-96D8-F5C95F769AA9}"/>
+              </a:ext>
+            </a:extLst>
+          </p:cNvPr>
+          <p:cNvSpPr txBox="1"/>
+          <p:nvPr/>
+        </p:nvSpPr>
+        <p:spPr>
+          <a:xfrm>
+            <a:off x="4173748" y="1973624"/>
+            <a:ext cx="6304530" cy="276999"/>
+          </a:xfrm>
+          <a:prstGeom prst="rect">
+            <a:avLst/>
+          </a:prstGeom>
+          <a:noFill/>
+        </p:spPr>
+        <p:txBody>
+          <a:bodyPr wrap="square" rtlCol="0">
+            <a:spAutoFit/>
+          </a:bodyPr>
+          <a:lstStyle/>
+          <a:p>
+            <a:pPr algn="just"/>
+            <a:r>
+              <a:rPr lang="en-US" sz="1200" b="1" dirty="0">
+                <a:solidFill>
+                  <a:srgbClr val="FF0000"/>
+                </a:solidFill>
+              </a:rPr>
+              <a:t>Select remove the comments checkbox to remove the added random contents</a:t>
+            </a:r>
+            <a:endParaRPr lang="en-SG" sz="1200" b="1" dirty="0">
+              <a:solidFill>
+                <a:srgbClr val="FF0000"/>
+              </a:solidFill>
+            </a:endParaRPr>
+          </a:p>
+        </p:txBody>
+      </p:sp>
+      <p:cxnSp>
+        <p:nvCxnSpPr>
+          <p:cNvPr id="18" name="Straight Arrow Connector 17">
+            <a:extLst>
+              <a:ext uri="{FF2B5EF4-FFF2-40B4-BE49-F238E27FC236}">
+                <a16:creationId xmlns:a16="http://schemas.microsoft.com/office/drawing/2014/main" id="{08B7148B-B6A1-6E59-2691-DA222B41F63B}"/>
+              </a:ext>
+            </a:extLst>
+          </p:cNvPr>
+          <p:cNvCxnSpPr>
+            <a:cxnSpLocks/>
+          </p:cNvCxnSpPr>
+          <p:nvPr/>
+        </p:nvCxnSpPr>
+        <p:spPr>
+          <a:xfrm flipH="1">
+            <a:off x="5141167" y="2402244"/>
+            <a:ext cx="195197" cy="90976"/>
+          </a:xfrm>
+          <a:prstGeom prst="straightConnector1">
+            <a:avLst/>
+          </a:prstGeom>
+          <a:ln>
+            <a:solidFill>
+              <a:srgbClr val="FF0000"/>
+            </a:solidFill>
+            <a:tailEnd type="triangle"/>
+          </a:ln>
+        </p:spPr>
+        <p:style>
+          <a:lnRef idx="2">
+            <a:schemeClr val="accent1"/>
+          </a:lnRef>
+          <a:fillRef idx="0">
+            <a:schemeClr val="accent1"/>
+          </a:fillRef>
+          <a:effectRef idx="1">
+            <a:schemeClr val="accent1"/>
+          </a:effectRef>
+          <a:fontRef idx="minor">
+            <a:schemeClr val="tx1"/>
+          </a:fontRef>
+        </p:style>
+      </p:cxnSp>
+      <p:sp>
+        <p:nvSpPr>
+          <p:cNvPr id="19" name="Oval 18">
+            <a:extLst>
+              <a:ext uri="{FF2B5EF4-FFF2-40B4-BE49-F238E27FC236}">
+                <a16:creationId xmlns:a16="http://schemas.microsoft.com/office/drawing/2014/main" id="{EEE981FB-D1E8-26AA-024C-9A7CE5AF78F1}"/>
+              </a:ext>
+            </a:extLst>
+          </p:cNvPr>
+          <p:cNvSpPr/>
+          <p:nvPr/>
+        </p:nvSpPr>
+        <p:spPr>
+          <a:xfrm>
+            <a:off x="5383869" y="2274138"/>
+            <a:ext cx="198642" cy="214127"/>
+          </a:xfrm>
+          <a:prstGeom prst="ellipse">
+            <a:avLst/>
+          </a:prstGeom>
+          <a:solidFill>
+            <a:srgbClr val="FFC000"/>
+          </a:solidFill>
+        </p:spPr>
+        <p:style>
+          <a:lnRef idx="2">
+            <a:schemeClr val="accent1">
+              <a:shade val="15000"/>
+            </a:schemeClr>
+          </a:lnRef>
+          <a:fillRef idx="1">
+            <a:schemeClr val="accent1"/>
+          </a:fillRef>
+          <a:effectRef idx="0">
+            <a:schemeClr val="accent1"/>
+          </a:effectRef>
+          <a:fontRef idx="minor">
+            <a:schemeClr val="lt1"/>
+          </a:fontRef>
+        </p:style>
+        <p:txBody>
+          <a:bodyPr rtlCol="0" anchor="ctr"/>
+          <a:lstStyle/>
+          <a:p>
+            <a:pPr algn="ctr"/>
+            <a:r>
+              <a:rPr lang="en-US" sz="1600" b="1" dirty="0">
+                <a:solidFill>
+                  <a:srgbClr val="C00000"/>
+                </a:solidFill>
+              </a:rPr>
+              <a:t>3</a:t>
+            </a:r>
+            <a:endParaRPr lang="en-SG" sz="1600" b="1" dirty="0">
+              <a:solidFill>
+                <a:srgbClr val="C00000"/>
+              </a:solidFill>
+            </a:endParaRPr>
+          </a:p>
+        </p:txBody>
+      </p:sp>
+      <p:sp>
+        <p:nvSpPr>
+          <p:cNvPr id="20" name="TextBox 19">
+            <a:extLst>
+              <a:ext uri="{FF2B5EF4-FFF2-40B4-BE49-F238E27FC236}">
+                <a16:creationId xmlns:a16="http://schemas.microsoft.com/office/drawing/2014/main" id="{7F95A21F-D622-9012-4CEC-C3B8E86C19CF}"/>
+              </a:ext>
+            </a:extLst>
+          </p:cNvPr>
+          <p:cNvSpPr txBox="1"/>
+          <p:nvPr/>
+        </p:nvSpPr>
+        <p:spPr>
+          <a:xfrm>
+            <a:off x="5520868" y="2184378"/>
+            <a:ext cx="1393051" cy="461665"/>
+          </a:xfrm>
+          <a:prstGeom prst="rect">
+            <a:avLst/>
+          </a:prstGeom>
+          <a:noFill/>
+        </p:spPr>
+        <p:txBody>
+          <a:bodyPr wrap="square" rtlCol="0">
+            <a:spAutoFit/>
+          </a:bodyPr>
+          <a:lstStyle/>
+          <a:p>
+            <a:pPr algn="just"/>
+            <a:r>
+              <a:rPr lang="en-US" sz="1200" b="1" dirty="0">
+                <a:solidFill>
+                  <a:srgbClr val="FF0000"/>
+                </a:solidFill>
+              </a:rPr>
+              <a:t>Press the decode button</a:t>
+            </a:r>
+            <a:endParaRPr lang="en-SG" sz="1200" b="1" dirty="0">
+              <a:solidFill>
+                <a:srgbClr val="FF0000"/>
+              </a:solidFill>
+            </a:endParaRPr>
+          </a:p>
+        </p:txBody>
+      </p:sp>
+      <p:sp>
+        <p:nvSpPr>
+          <p:cNvPr id="22" name="Rectangle 21">
+            <a:extLst>
+              <a:ext uri="{FF2B5EF4-FFF2-40B4-BE49-F238E27FC236}">
+                <a16:creationId xmlns:a16="http://schemas.microsoft.com/office/drawing/2014/main" id="{A67BCA39-E0D4-AE83-B930-A38CDDF69EAF}"/>
+              </a:ext>
+            </a:extLst>
+          </p:cNvPr>
+          <p:cNvSpPr/>
+          <p:nvPr/>
+        </p:nvSpPr>
+        <p:spPr>
+          <a:xfrm>
+            <a:off x="6855213" y="2732263"/>
+            <a:ext cx="3081890" cy="1424019"/>
+          </a:xfrm>
+          <a:prstGeom prst="rect">
+            <a:avLst/>
+          </a:prstGeom>
+          <a:noFill/>
+          <a:ln>
+            <a:solidFill>
+              <a:srgbClr val="FF0000"/>
+            </a:solidFill>
+            <a:prstDash val="sysDash"/>
+          </a:ln>
+        </p:spPr>
+        <p:style>
+          <a:lnRef idx="2">
+            <a:schemeClr val="accent1">
+              <a:shade val="15000"/>
+            </a:schemeClr>
+          </a:lnRef>
+          <a:fillRef idx="1">
+            <a:schemeClr val="accent1"/>
+          </a:fillRef>
+          <a:effectRef idx="0">
+            <a:schemeClr val="accent1"/>
+          </a:effectRef>
+          <a:fontRef idx="minor">
+            <a:schemeClr val="lt1"/>
+          </a:fontRef>
+        </p:style>
+        <p:txBody>
+          <a:bodyPr rtlCol="0" anchor="ctr"/>
+          <a:lstStyle/>
+          <a:p>
+            <a:pPr algn="ctr"/>
+            <a:endParaRPr lang="en-SG" dirty="0"/>
+          </a:p>
+        </p:txBody>
+      </p:sp>
+      <p:cxnSp>
+        <p:nvCxnSpPr>
+          <p:cNvPr id="23" name="Straight Arrow Connector 22">
+            <a:extLst>
+              <a:ext uri="{FF2B5EF4-FFF2-40B4-BE49-F238E27FC236}">
+                <a16:creationId xmlns:a16="http://schemas.microsoft.com/office/drawing/2014/main" id="{195A11F2-79C4-3AC9-4539-DF8A46E3BEE4}"/>
+              </a:ext>
+            </a:extLst>
+          </p:cNvPr>
+          <p:cNvCxnSpPr>
+            <a:cxnSpLocks/>
+          </p:cNvCxnSpPr>
+          <p:nvPr/>
+        </p:nvCxnSpPr>
+        <p:spPr>
+          <a:xfrm flipV="1">
+            <a:off x="7133584" y="2644067"/>
+            <a:ext cx="32264" cy="1967858"/>
+          </a:xfrm>
+          <a:prstGeom prst="straightConnector1">
+            <a:avLst/>
+          </a:prstGeom>
+          <a:ln>
+            <a:solidFill>
+              <a:srgbClr val="FF0000"/>
+            </a:solidFill>
+            <a:tailEnd type="triangle"/>
+          </a:ln>
+        </p:spPr>
+        <p:style>
+          <a:lnRef idx="2">
+            <a:schemeClr val="accent1"/>
+          </a:lnRef>
+          <a:fillRef idx="0">
+            <a:schemeClr val="accent1"/>
+          </a:fillRef>
+          <a:effectRef idx="1">
+            <a:schemeClr val="accent1"/>
+          </a:effectRef>
+          <a:fontRef idx="minor">
+            <a:schemeClr val="tx1"/>
+          </a:fontRef>
+        </p:style>
+      </p:cxnSp>
+      <p:cxnSp>
+        <p:nvCxnSpPr>
+          <p:cNvPr id="24" name="Straight Arrow Connector 23">
+            <a:extLst>
+              <a:ext uri="{FF2B5EF4-FFF2-40B4-BE49-F238E27FC236}">
+                <a16:creationId xmlns:a16="http://schemas.microsoft.com/office/drawing/2014/main" id="{9C3BA4CD-E9F4-100B-7FC3-6DFFDD683D72}"/>
+              </a:ext>
+            </a:extLst>
+          </p:cNvPr>
+          <p:cNvCxnSpPr>
+            <a:cxnSpLocks/>
+          </p:cNvCxnSpPr>
+          <p:nvPr/>
+        </p:nvCxnSpPr>
+        <p:spPr>
+          <a:xfrm flipV="1">
+            <a:off x="7311930" y="4228560"/>
+            <a:ext cx="0" cy="383365"/>
+          </a:xfrm>
+          <a:prstGeom prst="straightConnector1">
+            <a:avLst/>
+          </a:prstGeom>
+          <a:ln>
+            <a:solidFill>
+              <a:srgbClr val="FF0000"/>
+            </a:solidFill>
+            <a:tailEnd type="triangle"/>
+          </a:ln>
+        </p:spPr>
+        <p:style>
+          <a:lnRef idx="2">
+            <a:schemeClr val="accent1"/>
+          </a:lnRef>
+          <a:fillRef idx="0">
+            <a:schemeClr val="accent1"/>
+          </a:fillRef>
+          <a:effectRef idx="1">
+            <a:schemeClr val="accent1"/>
+          </a:effectRef>
+          <a:fontRef idx="minor">
+            <a:schemeClr val="tx1"/>
+          </a:fontRef>
+        </p:style>
+      </p:cxnSp>
+      <p:sp>
+        <p:nvSpPr>
+          <p:cNvPr id="25" name="Oval 24">
+            <a:extLst>
+              <a:ext uri="{FF2B5EF4-FFF2-40B4-BE49-F238E27FC236}">
+                <a16:creationId xmlns:a16="http://schemas.microsoft.com/office/drawing/2014/main" id="{25FE20BB-87A3-A248-C908-5405ECC8F7E8}"/>
+              </a:ext>
+            </a:extLst>
+          </p:cNvPr>
+          <p:cNvSpPr/>
+          <p:nvPr/>
+        </p:nvSpPr>
+        <p:spPr>
+          <a:xfrm>
+            <a:off x="7113288" y="4641212"/>
+            <a:ext cx="198642" cy="214127"/>
+          </a:xfrm>
+          <a:prstGeom prst="ellipse">
+            <a:avLst/>
+          </a:prstGeom>
+          <a:solidFill>
+            <a:srgbClr val="FFC000"/>
+          </a:solidFill>
+        </p:spPr>
+        <p:style>
+          <a:lnRef idx="2">
+            <a:schemeClr val="accent1">
+              <a:shade val="15000"/>
+            </a:schemeClr>
+          </a:lnRef>
+          <a:fillRef idx="1">
+            <a:schemeClr val="accent1"/>
+          </a:fillRef>
+          <a:effectRef idx="0">
+            <a:schemeClr val="accent1"/>
+          </a:effectRef>
+          <a:fontRef idx="minor">
+            <a:schemeClr val="lt1"/>
+          </a:fontRef>
+        </p:style>
+        <p:txBody>
+          <a:bodyPr rtlCol="0" anchor="ctr"/>
+          <a:lstStyle/>
+          <a:p>
+            <a:pPr algn="ctr"/>
+            <a:r>
+              <a:rPr lang="en-US" sz="1600" b="1" dirty="0">
+                <a:solidFill>
+                  <a:srgbClr val="C00000"/>
+                </a:solidFill>
+              </a:rPr>
+              <a:t>4</a:t>
+            </a:r>
+            <a:endParaRPr lang="en-SG" sz="1600" b="1" dirty="0">
+              <a:solidFill>
+                <a:srgbClr val="C00000"/>
+              </a:solidFill>
+            </a:endParaRPr>
+          </a:p>
+        </p:txBody>
+      </p:sp>
+      <p:sp>
+        <p:nvSpPr>
+          <p:cNvPr id="26" name="TextBox 25">
+            <a:extLst>
+              <a:ext uri="{FF2B5EF4-FFF2-40B4-BE49-F238E27FC236}">
+                <a16:creationId xmlns:a16="http://schemas.microsoft.com/office/drawing/2014/main" id="{AA8376AF-A38C-FFD4-06F0-BE7A2D9C294E}"/>
+              </a:ext>
+            </a:extLst>
+          </p:cNvPr>
+          <p:cNvSpPr txBox="1"/>
+          <p:nvPr/>
+        </p:nvSpPr>
+        <p:spPr>
+          <a:xfrm>
+            <a:off x="7311930" y="4488155"/>
+            <a:ext cx="2933412" cy="461665"/>
+          </a:xfrm>
+          <a:prstGeom prst="rect">
+            <a:avLst/>
+          </a:prstGeom>
+          <a:noFill/>
+        </p:spPr>
+        <p:txBody>
+          <a:bodyPr wrap="square" rtlCol="0">
+            <a:spAutoFit/>
+          </a:bodyPr>
+          <a:lstStyle/>
+          <a:p>
+            <a:pPr algn="just"/>
+            <a:r>
+              <a:rPr lang="en-US" sz="1200" b="1" dirty="0">
+                <a:solidFill>
+                  <a:srgbClr val="FF0000"/>
+                </a:solidFill>
+              </a:rPr>
+              <a:t>Copy the decoded source code or press the copy to clipboard button</a:t>
+            </a:r>
+            <a:endParaRPr lang="en-SG" sz="1200" b="1" dirty="0">
+              <a:solidFill>
+                <a:srgbClr val="FF0000"/>
+              </a:solidFill>
+            </a:endParaRPr>
+          </a:p>
+        </p:txBody>
+      </p:sp>
+    </p:spTree>
+    <p:extLst>
+      <p:ext uri="{BB962C8B-B14F-4D97-AF65-F5344CB8AC3E}">
+        <p14:creationId xmlns:p14="http://schemas.microsoft.com/office/powerpoint/2010/main" val="519744296"/>
       </p:ext>
     </p:extLst>
   </p:cSld>

</xml_diff>

<commit_message>
improve the design doc and update the read me file.
</commit_message>
<xml_diff>
--- a/doc/designDoc.pptx
+++ b/doc/designDoc.pptx
@@ -5,14 +5,15 @@
     <p:sldMasterId id="2147483648" r:id="rId1"/>
   </p:sldMasterIdLst>
   <p:notesMasterIdLst>
-    <p:notesMasterId r:id="rId7"/>
+    <p:notesMasterId r:id="rId8"/>
   </p:notesMasterIdLst>
   <p:sldIdLst>
     <p:sldId id="308" r:id="rId2"/>
     <p:sldId id="256" r:id="rId3"/>
     <p:sldId id="309" r:id="rId4"/>
-    <p:sldId id="310" r:id="rId5"/>
-    <p:sldId id="311" r:id="rId6"/>
+    <p:sldId id="312" r:id="rId5"/>
+    <p:sldId id="310" r:id="rId6"/>
+    <p:sldId id="311" r:id="rId7"/>
   </p:sldIdLst>
   <p:sldSz cx="12192000" cy="6858000"/>
   <p:notesSz cx="6858000" cy="9144000"/>
@@ -201,7 +202,7 @@
           <a:p>
             <a:fld id="{AF2C2981-1FE2-4447-B408-034229FC8297}" type="datetimeFigureOut">
               <a:rPr lang="en-SG" smtClean="0"/>
-              <a:t>23/3/2024</a:t>
+              <a:t>24/3/2024</a:t>
             </a:fld>
             <a:endParaRPr lang="en-SG"/>
           </a:p>
@@ -553,6 +554,90 @@
 </p:notes>
 </file>
 
+<file path=ppt/notesSlides/notesSlide2.xml><?xml version="1.0" encoding="utf-8"?>
+<p:notes xmlns:a="http://schemas.openxmlformats.org/drawingml/2006/main" xmlns:r="http://schemas.openxmlformats.org/officeDocument/2006/relationships" xmlns:p="http://schemas.openxmlformats.org/presentationml/2006/main">
+  <p:cSld>
+    <p:spTree>
+      <p:nvGrpSpPr>
+        <p:cNvPr id="1" name=""/>
+        <p:cNvGrpSpPr/>
+        <p:nvPr/>
+      </p:nvGrpSpPr>
+      <p:grpSpPr>
+        <a:xfrm>
+          <a:off x="0" y="0"/>
+          <a:ext cx="0" cy="0"/>
+          <a:chOff x="0" y="0"/>
+          <a:chExt cx="0" cy="0"/>
+        </a:xfrm>
+      </p:grpSpPr>
+      <p:sp>
+        <p:nvSpPr>
+          <p:cNvPr id="2" name="Slide Image Placeholder 1"/>
+          <p:cNvSpPr>
+            <a:spLocks noGrp="1" noRot="1" noChangeAspect="1"/>
+          </p:cNvSpPr>
+          <p:nvPr>
+            <p:ph type="sldImg"/>
+          </p:nvPr>
+        </p:nvSpPr>
+        <p:spPr/>
+      </p:sp>
+      <p:sp>
+        <p:nvSpPr>
+          <p:cNvPr id="3" name="Notes Placeholder 2"/>
+          <p:cNvSpPr>
+            <a:spLocks noGrp="1"/>
+          </p:cNvSpPr>
+          <p:nvPr>
+            <p:ph type="body" idx="1"/>
+          </p:nvPr>
+        </p:nvSpPr>
+        <p:spPr/>
+        <p:txBody>
+          <a:bodyPr/>
+          <a:lstStyle/>
+          <a:p>
+            <a:endParaRPr lang="en-SG" dirty="0"/>
+          </a:p>
+        </p:txBody>
+      </p:sp>
+      <p:sp>
+        <p:nvSpPr>
+          <p:cNvPr id="4" name="Slide Number Placeholder 3"/>
+          <p:cNvSpPr>
+            <a:spLocks noGrp="1"/>
+          </p:cNvSpPr>
+          <p:nvPr>
+            <p:ph type="sldNum" sz="quarter" idx="5"/>
+          </p:nvPr>
+        </p:nvSpPr>
+        <p:spPr/>
+        <p:txBody>
+          <a:bodyPr/>
+          <a:lstStyle/>
+          <a:p>
+            <a:fld id="{057EA0E7-08FB-4AB0-B2AC-B31C73135677}" type="slidenum">
+              <a:rPr lang="en-SG" smtClean="0"/>
+              <a:t>4</a:t>
+            </a:fld>
+            <a:endParaRPr lang="en-SG"/>
+          </a:p>
+        </p:txBody>
+      </p:sp>
+    </p:spTree>
+    <p:extLst>
+      <p:ext uri="{BB962C8B-B14F-4D97-AF65-F5344CB8AC3E}">
+        <p14:creationId xmlns:p14="http://schemas.microsoft.com/office/powerpoint/2010/main" val="2571325581"/>
+      </p:ext>
+    </p:extLst>
+  </p:cSld>
+  <p:clrMapOvr>
+    <a:masterClrMapping/>
+  </p:clrMapOvr>
+</p:notes>
+</file>
+
 <file path=ppt/slideLayouts/slideLayout1.xml><?xml version="1.0" encoding="utf-8"?>
 <p:sldLayout xmlns:a="http://schemas.openxmlformats.org/drawingml/2006/main" xmlns:r="http://schemas.openxmlformats.org/officeDocument/2006/relationships" xmlns:p="http://schemas.openxmlformats.org/presentationml/2006/main" type="title" preserve="1">
   <p:cSld name="Title Slide">
@@ -702,7 +787,7 @@
           <a:p>
             <a:fld id="{2C179E8E-2AE7-4247-A617-7ED7B33F3E0B}" type="datetimeFigureOut">
               <a:rPr lang="en-SG" smtClean="0"/>
-              <a:t>23/3/2024</a:t>
+              <a:t>24/3/2024</a:t>
             </a:fld>
             <a:endParaRPr lang="en-SG"/>
           </a:p>
@@ -902,7 +987,7 @@
           <a:p>
             <a:fld id="{2C179E8E-2AE7-4247-A617-7ED7B33F3E0B}" type="datetimeFigureOut">
               <a:rPr lang="en-SG" smtClean="0"/>
-              <a:t>23/3/2024</a:t>
+              <a:t>24/3/2024</a:t>
             </a:fld>
             <a:endParaRPr lang="en-SG"/>
           </a:p>
@@ -1112,7 +1197,7 @@
           <a:p>
             <a:fld id="{2C179E8E-2AE7-4247-A617-7ED7B33F3E0B}" type="datetimeFigureOut">
               <a:rPr lang="en-SG" smtClean="0"/>
-              <a:t>23/3/2024</a:t>
+              <a:t>24/3/2024</a:t>
             </a:fld>
             <a:endParaRPr lang="en-SG"/>
           </a:p>
@@ -1312,7 +1397,7 @@
           <a:p>
             <a:fld id="{2C179E8E-2AE7-4247-A617-7ED7B33F3E0B}" type="datetimeFigureOut">
               <a:rPr lang="en-SG" smtClean="0"/>
-              <a:t>23/3/2024</a:t>
+              <a:t>24/3/2024</a:t>
             </a:fld>
             <a:endParaRPr lang="en-SG"/>
           </a:p>
@@ -1588,7 +1673,7 @@
           <a:p>
             <a:fld id="{2C179E8E-2AE7-4247-A617-7ED7B33F3E0B}" type="datetimeFigureOut">
               <a:rPr lang="en-SG" smtClean="0"/>
-              <a:t>23/3/2024</a:t>
+              <a:t>24/3/2024</a:t>
             </a:fld>
             <a:endParaRPr lang="en-SG"/>
           </a:p>
@@ -1856,7 +1941,7 @@
           <a:p>
             <a:fld id="{2C179E8E-2AE7-4247-A617-7ED7B33F3E0B}" type="datetimeFigureOut">
               <a:rPr lang="en-SG" smtClean="0"/>
-              <a:t>23/3/2024</a:t>
+              <a:t>24/3/2024</a:t>
             </a:fld>
             <a:endParaRPr lang="en-SG"/>
           </a:p>
@@ -2271,7 +2356,7 @@
           <a:p>
             <a:fld id="{2C179E8E-2AE7-4247-A617-7ED7B33F3E0B}" type="datetimeFigureOut">
               <a:rPr lang="en-SG" smtClean="0"/>
-              <a:t>23/3/2024</a:t>
+              <a:t>24/3/2024</a:t>
             </a:fld>
             <a:endParaRPr lang="en-SG"/>
           </a:p>
@@ -2413,7 +2498,7 @@
           <a:p>
             <a:fld id="{2C179E8E-2AE7-4247-A617-7ED7B33F3E0B}" type="datetimeFigureOut">
               <a:rPr lang="en-SG" smtClean="0"/>
-              <a:t>23/3/2024</a:t>
+              <a:t>24/3/2024</a:t>
             </a:fld>
             <a:endParaRPr lang="en-SG"/>
           </a:p>
@@ -2526,7 +2611,7 @@
           <a:p>
             <a:fld id="{2C179E8E-2AE7-4247-A617-7ED7B33F3E0B}" type="datetimeFigureOut">
               <a:rPr lang="en-SG" smtClean="0"/>
-              <a:t>23/3/2024</a:t>
+              <a:t>24/3/2024</a:t>
             </a:fld>
             <a:endParaRPr lang="en-SG"/>
           </a:p>
@@ -2839,7 +2924,7 @@
           <a:p>
             <a:fld id="{2C179E8E-2AE7-4247-A617-7ED7B33F3E0B}" type="datetimeFigureOut">
               <a:rPr lang="en-SG" smtClean="0"/>
-              <a:t>23/3/2024</a:t>
+              <a:t>24/3/2024</a:t>
             </a:fld>
             <a:endParaRPr lang="en-SG"/>
           </a:p>
@@ -3128,7 +3213,7 @@
           <a:p>
             <a:fld id="{2C179E8E-2AE7-4247-A617-7ED7B33F3E0B}" type="datetimeFigureOut">
               <a:rPr lang="en-SG" smtClean="0"/>
-              <a:t>23/3/2024</a:t>
+              <a:t>24/3/2024</a:t>
             </a:fld>
             <a:endParaRPr lang="en-SG"/>
           </a:p>
@@ -3371,7 +3456,7 @@
           <a:p>
             <a:fld id="{2C179E8E-2AE7-4247-A617-7ED7B33F3E0B}" type="datetimeFigureOut">
               <a:rPr lang="en-SG" smtClean="0"/>
-              <a:t>23/3/2024</a:t>
+              <a:t>24/3/2024</a:t>
             </a:fld>
             <a:endParaRPr lang="en-SG"/>
           </a:p>
@@ -5191,7 +5276,7 @@
         </p:nvSpPr>
         <p:spPr>
           <a:xfrm>
-            <a:off x="789777" y="696491"/>
+            <a:off x="905487" y="680189"/>
             <a:ext cx="2365685" cy="307777"/>
           </a:xfrm>
           <a:prstGeom prst="rect">
@@ -5377,23 +5462,7 @@
                   <a:schemeClr val="tx1"/>
                 </a:solidFill>
               </a:rPr>
-              <a:t> Code </a:t>
-            </a:r>
-            <a:r>
-              <a:rPr lang="en-US" sz="1200" b="1" dirty="0" err="1">
-                <a:solidFill>
-                  <a:schemeClr val="tx1"/>
-                </a:solidFill>
-              </a:rPr>
-              <a:t>sontent</a:t>
-            </a:r>
-            <a:r>
-              <a:rPr lang="en-US" sz="1200" b="1" dirty="0">
-                <a:solidFill>
-                  <a:schemeClr val="tx1"/>
-                </a:solidFill>
-              </a:rPr>
-              <a:t> B64 Encode</a:t>
+              <a:t> Code content B64 Encode</a:t>
             </a:r>
             <a:endParaRPr lang="en-SG" sz="1200" b="1" dirty="0">
               <a:solidFill>
@@ -5825,7 +5894,7 @@
         </p:nvSpPr>
         <p:spPr>
           <a:xfrm>
-            <a:off x="4805302" y="3206922"/>
+            <a:off x="5011117" y="3178628"/>
             <a:ext cx="3106849" cy="307777"/>
           </a:xfrm>
           <a:prstGeom prst="rect">
@@ -5907,7 +5976,7 @@
         </p:nvSpPr>
         <p:spPr>
           <a:xfrm>
-            <a:off x="4879758" y="4906534"/>
+            <a:off x="5072035" y="4896531"/>
             <a:ext cx="3106849" cy="307777"/>
           </a:xfrm>
           <a:prstGeom prst="rect">
@@ -6985,6 +7054,2118 @@
           <a:chExt cx="0" cy="0"/>
         </a:xfrm>
       </p:grpSpPr>
+      <p:sp>
+        <p:nvSpPr>
+          <p:cNvPr id="9" name="Rectangle 8">
+            <a:extLst>
+              <a:ext uri="{FF2B5EF4-FFF2-40B4-BE49-F238E27FC236}">
+                <a16:creationId xmlns:a16="http://schemas.microsoft.com/office/drawing/2014/main" id="{FDEF681A-87F6-8B3B-1BD2-754DF77C2338}"/>
+              </a:ext>
+            </a:extLst>
+          </p:cNvPr>
+          <p:cNvSpPr/>
+          <p:nvPr/>
+        </p:nvSpPr>
+        <p:spPr>
+          <a:xfrm>
+            <a:off x="609600" y="717563"/>
+            <a:ext cx="10775879" cy="5491649"/>
+          </a:xfrm>
+          <a:prstGeom prst="rect">
+            <a:avLst/>
+          </a:prstGeom>
+          <a:noFill/>
+          <a:ln w="9525" cap="flat" cmpd="sng" algn="ctr">
+            <a:solidFill>
+              <a:schemeClr val="dk1"/>
+            </a:solidFill>
+            <a:prstDash val="solid"/>
+            <a:round/>
+            <a:headEnd type="none" w="med" len="med"/>
+            <a:tailEnd type="none" w="med" len="med"/>
+          </a:ln>
+        </p:spPr>
+        <p:style>
+          <a:lnRef idx="0">
+            <a:scrgbClr r="0" g="0" b="0"/>
+          </a:lnRef>
+          <a:fillRef idx="0">
+            <a:scrgbClr r="0" g="0" b="0"/>
+          </a:fillRef>
+          <a:effectRef idx="0">
+            <a:scrgbClr r="0" g="0" b="0"/>
+          </a:effectRef>
+          <a:fontRef idx="minor">
+            <a:schemeClr val="dk1"/>
+          </a:fontRef>
+        </p:style>
+        <p:txBody>
+          <a:bodyPr rtlCol="0" anchor="ctr"/>
+          <a:lstStyle/>
+          <a:p>
+            <a:pPr algn="ctr"/>
+            <a:endParaRPr lang="en-SG" dirty="0"/>
+          </a:p>
+        </p:txBody>
+      </p:sp>
+      <p:pic>
+        <p:nvPicPr>
+          <p:cNvPr id="7" name="Picture 6">
+            <a:extLst>
+              <a:ext uri="{FF2B5EF4-FFF2-40B4-BE49-F238E27FC236}">
+                <a16:creationId xmlns:a16="http://schemas.microsoft.com/office/drawing/2014/main" id="{E603041C-E0CB-B7DD-6F9F-0DDFDBC4B464}"/>
+              </a:ext>
+            </a:extLst>
+          </p:cNvPr>
+          <p:cNvPicPr>
+            <a:picLocks noChangeAspect="1"/>
+          </p:cNvPicPr>
+          <p:nvPr/>
+        </p:nvPicPr>
+        <p:blipFill>
+          <a:blip r:embed="rId3"/>
+          <a:stretch>
+            <a:fillRect/>
+          </a:stretch>
+        </p:blipFill>
+        <p:spPr>
+          <a:xfrm>
+            <a:off x="841355" y="1200308"/>
+            <a:ext cx="3149177" cy="1724174"/>
+          </a:xfrm>
+          <a:prstGeom prst="rect">
+            <a:avLst/>
+          </a:prstGeom>
+        </p:spPr>
+      </p:pic>
+      <p:cxnSp>
+        <p:nvCxnSpPr>
+          <p:cNvPr id="8" name="Straight Arrow Connector 7">
+            <a:extLst>
+              <a:ext uri="{FF2B5EF4-FFF2-40B4-BE49-F238E27FC236}">
+                <a16:creationId xmlns:a16="http://schemas.microsoft.com/office/drawing/2014/main" id="{F74B5E09-F4E7-74D1-ECB3-2AEC85E107CF}"/>
+              </a:ext>
+            </a:extLst>
+          </p:cNvPr>
+          <p:cNvCxnSpPr>
+            <a:cxnSpLocks/>
+            <a:endCxn id="11" idx="1"/>
+          </p:cNvCxnSpPr>
+          <p:nvPr/>
+        </p:nvCxnSpPr>
+        <p:spPr>
+          <a:xfrm>
+            <a:off x="3990532" y="1575541"/>
+            <a:ext cx="490819" cy="3913"/>
+          </a:xfrm>
+          <a:prstGeom prst="straightConnector1">
+            <a:avLst/>
+          </a:prstGeom>
+          <a:ln w="28575">
+            <a:solidFill>
+              <a:schemeClr val="accent6">
+                <a:lumMod val="75000"/>
+              </a:schemeClr>
+            </a:solidFill>
+            <a:tailEnd type="triangle"/>
+          </a:ln>
+        </p:spPr>
+        <p:style>
+          <a:lnRef idx="2">
+            <a:schemeClr val="accent1"/>
+          </a:lnRef>
+          <a:fillRef idx="0">
+            <a:schemeClr val="accent1"/>
+          </a:fillRef>
+          <a:effectRef idx="1">
+            <a:schemeClr val="accent1"/>
+          </a:effectRef>
+          <a:fontRef idx="minor">
+            <a:schemeClr val="tx1"/>
+          </a:fontRef>
+        </p:style>
+      </p:cxnSp>
+      <p:sp>
+        <p:nvSpPr>
+          <p:cNvPr id="11" name="Rectangle 10">
+            <a:extLst>
+              <a:ext uri="{FF2B5EF4-FFF2-40B4-BE49-F238E27FC236}">
+                <a16:creationId xmlns:a16="http://schemas.microsoft.com/office/drawing/2014/main" id="{23C267BB-5C29-DD99-D414-2BE526134ABD}"/>
+              </a:ext>
+            </a:extLst>
+          </p:cNvPr>
+          <p:cNvSpPr/>
+          <p:nvPr/>
+        </p:nvSpPr>
+        <p:spPr>
+          <a:xfrm>
+            <a:off x="4481351" y="1370448"/>
+            <a:ext cx="1660777" cy="418011"/>
+          </a:xfrm>
+          <a:prstGeom prst="rect">
+            <a:avLst/>
+          </a:prstGeom>
+          <a:solidFill>
+            <a:schemeClr val="accent6">
+              <a:lumMod val="40000"/>
+              <a:lumOff val="60000"/>
+            </a:schemeClr>
+          </a:solidFill>
+        </p:spPr>
+        <p:style>
+          <a:lnRef idx="2">
+            <a:schemeClr val="accent1">
+              <a:shade val="15000"/>
+            </a:schemeClr>
+          </a:lnRef>
+          <a:fillRef idx="1">
+            <a:schemeClr val="accent1"/>
+          </a:fillRef>
+          <a:effectRef idx="0">
+            <a:schemeClr val="accent1"/>
+          </a:effectRef>
+          <a:fontRef idx="minor">
+            <a:schemeClr val="lt1"/>
+          </a:fontRef>
+        </p:style>
+        <p:txBody>
+          <a:bodyPr rtlCol="0" anchor="ctr"/>
+          <a:lstStyle/>
+          <a:p>
+            <a:pPr algn="ctr"/>
+            <a:r>
+              <a:rPr lang="en-US" sz="1200" b="1" dirty="0">
+                <a:solidFill>
+                  <a:schemeClr val="tx1"/>
+                </a:solidFill>
+              </a:rPr>
+              <a:t> Removes comments &amp; doc strings</a:t>
+            </a:r>
+            <a:endParaRPr lang="en-SG" sz="1200" b="1" dirty="0">
+              <a:solidFill>
+                <a:schemeClr val="tx1"/>
+              </a:solidFill>
+            </a:endParaRPr>
+          </a:p>
+        </p:txBody>
+      </p:sp>
+      <p:cxnSp>
+        <p:nvCxnSpPr>
+          <p:cNvPr id="13" name="Straight Arrow Connector 12">
+            <a:extLst>
+              <a:ext uri="{FF2B5EF4-FFF2-40B4-BE49-F238E27FC236}">
+                <a16:creationId xmlns:a16="http://schemas.microsoft.com/office/drawing/2014/main" id="{11E98E30-497C-5A98-57AD-0F874DC3BE15}"/>
+              </a:ext>
+            </a:extLst>
+          </p:cNvPr>
+          <p:cNvCxnSpPr>
+            <a:cxnSpLocks/>
+          </p:cNvCxnSpPr>
+          <p:nvPr/>
+        </p:nvCxnSpPr>
+        <p:spPr>
+          <a:xfrm>
+            <a:off x="6142128" y="1579454"/>
+            <a:ext cx="202920" cy="0"/>
+          </a:xfrm>
+          <a:prstGeom prst="straightConnector1">
+            <a:avLst/>
+          </a:prstGeom>
+          <a:ln w="28575">
+            <a:solidFill>
+              <a:schemeClr val="accent6">
+                <a:lumMod val="75000"/>
+              </a:schemeClr>
+            </a:solidFill>
+            <a:tailEnd type="triangle"/>
+          </a:ln>
+        </p:spPr>
+        <p:style>
+          <a:lnRef idx="2">
+            <a:schemeClr val="accent1"/>
+          </a:lnRef>
+          <a:fillRef idx="0">
+            <a:schemeClr val="accent1"/>
+          </a:fillRef>
+          <a:effectRef idx="1">
+            <a:schemeClr val="accent1"/>
+          </a:effectRef>
+          <a:fontRef idx="minor">
+            <a:schemeClr val="tx1"/>
+          </a:fontRef>
+        </p:style>
+      </p:cxnSp>
+      <p:sp>
+        <p:nvSpPr>
+          <p:cNvPr id="16" name="TextBox 15">
+            <a:extLst>
+              <a:ext uri="{FF2B5EF4-FFF2-40B4-BE49-F238E27FC236}">
+                <a16:creationId xmlns:a16="http://schemas.microsoft.com/office/drawing/2014/main" id="{61609EE6-4170-20C6-2CB8-8FC233D866A3}"/>
+              </a:ext>
+            </a:extLst>
+          </p:cNvPr>
+          <p:cNvSpPr txBox="1"/>
+          <p:nvPr/>
+        </p:nvSpPr>
+        <p:spPr>
+          <a:xfrm>
+            <a:off x="807194" y="922914"/>
+            <a:ext cx="2365685" cy="307777"/>
+          </a:xfrm>
+          <a:prstGeom prst="rect">
+            <a:avLst/>
+          </a:prstGeom>
+          <a:noFill/>
+        </p:spPr>
+        <p:txBody>
+          <a:bodyPr wrap="square" rtlCol="0">
+            <a:spAutoFit/>
+          </a:bodyPr>
+          <a:lstStyle/>
+          <a:p>
+            <a:r>
+              <a:rPr lang="en-US" sz="1400" b="1" dirty="0"/>
+              <a:t>Python Source Code </a:t>
+            </a:r>
+            <a:endParaRPr lang="en-SG" sz="1400" b="1" dirty="0"/>
+          </a:p>
+        </p:txBody>
+      </p:sp>
+      <p:sp>
+        <p:nvSpPr>
+          <p:cNvPr id="20" name="Rectangle 19">
+            <a:extLst>
+              <a:ext uri="{FF2B5EF4-FFF2-40B4-BE49-F238E27FC236}">
+                <a16:creationId xmlns:a16="http://schemas.microsoft.com/office/drawing/2014/main" id="{E2CD0D47-8502-E048-4A8E-36A87C08E3EF}"/>
+              </a:ext>
+            </a:extLst>
+          </p:cNvPr>
+          <p:cNvSpPr/>
+          <p:nvPr/>
+        </p:nvSpPr>
+        <p:spPr>
+          <a:xfrm>
+            <a:off x="6105552" y="2126740"/>
+            <a:ext cx="1074650" cy="418011"/>
+          </a:xfrm>
+          <a:prstGeom prst="rect">
+            <a:avLst/>
+          </a:prstGeom>
+          <a:solidFill>
+            <a:schemeClr val="accent6">
+              <a:lumMod val="40000"/>
+              <a:lumOff val="60000"/>
+            </a:schemeClr>
+          </a:solidFill>
+        </p:spPr>
+        <p:style>
+          <a:lnRef idx="2">
+            <a:schemeClr val="accent1">
+              <a:shade val="15000"/>
+            </a:schemeClr>
+          </a:lnRef>
+          <a:fillRef idx="1">
+            <a:schemeClr val="accent1"/>
+          </a:fillRef>
+          <a:effectRef idx="0">
+            <a:schemeClr val="accent1"/>
+          </a:effectRef>
+          <a:fontRef idx="minor">
+            <a:schemeClr val="lt1"/>
+          </a:fontRef>
+        </p:style>
+        <p:txBody>
+          <a:bodyPr rtlCol="0" anchor="ctr"/>
+          <a:lstStyle/>
+          <a:p>
+            <a:pPr algn="ctr"/>
+            <a:r>
+              <a:rPr lang="en-US" sz="1200" b="1" dirty="0">
+                <a:solidFill>
+                  <a:schemeClr val="tx1"/>
+                </a:solidFill>
+              </a:rPr>
+              <a:t> Code string compress </a:t>
+            </a:r>
+            <a:endParaRPr lang="en-SG" sz="1200" b="1" dirty="0">
+              <a:solidFill>
+                <a:schemeClr val="tx1"/>
+              </a:solidFill>
+            </a:endParaRPr>
+          </a:p>
+        </p:txBody>
+      </p:sp>
+      <p:cxnSp>
+        <p:nvCxnSpPr>
+          <p:cNvPr id="21" name="Straight Arrow Connector 20">
+            <a:extLst>
+              <a:ext uri="{FF2B5EF4-FFF2-40B4-BE49-F238E27FC236}">
+                <a16:creationId xmlns:a16="http://schemas.microsoft.com/office/drawing/2014/main" id="{D9E462D2-8155-873B-F7F7-7AF5325B38B1}"/>
+              </a:ext>
+            </a:extLst>
+          </p:cNvPr>
+          <p:cNvCxnSpPr>
+            <a:cxnSpLocks/>
+          </p:cNvCxnSpPr>
+          <p:nvPr/>
+        </p:nvCxnSpPr>
+        <p:spPr>
+          <a:xfrm>
+            <a:off x="6581959" y="1801181"/>
+            <a:ext cx="0" cy="325559"/>
+          </a:xfrm>
+          <a:prstGeom prst="straightConnector1">
+            <a:avLst/>
+          </a:prstGeom>
+          <a:ln w="28575">
+            <a:solidFill>
+              <a:schemeClr val="accent6">
+                <a:lumMod val="75000"/>
+              </a:schemeClr>
+            </a:solidFill>
+            <a:tailEnd type="triangle"/>
+          </a:ln>
+        </p:spPr>
+        <p:style>
+          <a:lnRef idx="2">
+            <a:schemeClr val="accent1"/>
+          </a:lnRef>
+          <a:fillRef idx="0">
+            <a:schemeClr val="accent1"/>
+          </a:fillRef>
+          <a:effectRef idx="1">
+            <a:schemeClr val="accent1"/>
+          </a:effectRef>
+          <a:fontRef idx="minor">
+            <a:schemeClr val="tx1"/>
+          </a:fontRef>
+        </p:style>
+      </p:cxnSp>
+      <p:sp>
+        <p:nvSpPr>
+          <p:cNvPr id="22" name="Rectangle 21">
+            <a:extLst>
+              <a:ext uri="{FF2B5EF4-FFF2-40B4-BE49-F238E27FC236}">
+                <a16:creationId xmlns:a16="http://schemas.microsoft.com/office/drawing/2014/main" id="{1BA80DED-B01F-0085-214F-FEC67AA8BF48}"/>
+              </a:ext>
+            </a:extLst>
+          </p:cNvPr>
+          <p:cNvSpPr/>
+          <p:nvPr/>
+        </p:nvSpPr>
+        <p:spPr>
+          <a:xfrm>
+            <a:off x="7516395" y="2116113"/>
+            <a:ext cx="1191309" cy="418011"/>
+          </a:xfrm>
+          <a:prstGeom prst="rect">
+            <a:avLst/>
+          </a:prstGeom>
+          <a:solidFill>
+            <a:schemeClr val="accent6">
+              <a:lumMod val="40000"/>
+              <a:lumOff val="60000"/>
+            </a:schemeClr>
+          </a:solidFill>
+        </p:spPr>
+        <p:style>
+          <a:lnRef idx="2">
+            <a:schemeClr val="accent1">
+              <a:shade val="15000"/>
+            </a:schemeClr>
+          </a:lnRef>
+          <a:fillRef idx="1">
+            <a:schemeClr val="accent1"/>
+          </a:fillRef>
+          <a:effectRef idx="0">
+            <a:schemeClr val="accent1"/>
+          </a:effectRef>
+          <a:fontRef idx="minor">
+            <a:schemeClr val="lt1"/>
+          </a:fontRef>
+        </p:style>
+        <p:txBody>
+          <a:bodyPr rtlCol="0" anchor="ctr"/>
+          <a:lstStyle/>
+          <a:p>
+            <a:pPr algn="ctr"/>
+            <a:r>
+              <a:rPr lang="en-US" sz="1200" b="1" dirty="0">
+                <a:solidFill>
+                  <a:schemeClr val="tx1"/>
+                </a:solidFill>
+              </a:rPr>
+              <a:t> Code content B64 Encode</a:t>
+            </a:r>
+            <a:endParaRPr lang="en-SG" sz="1200" b="1" dirty="0">
+              <a:solidFill>
+                <a:schemeClr val="tx1"/>
+              </a:solidFill>
+            </a:endParaRPr>
+          </a:p>
+        </p:txBody>
+      </p:sp>
+      <p:cxnSp>
+        <p:nvCxnSpPr>
+          <p:cNvPr id="23" name="Straight Arrow Connector 22">
+            <a:extLst>
+              <a:ext uri="{FF2B5EF4-FFF2-40B4-BE49-F238E27FC236}">
+                <a16:creationId xmlns:a16="http://schemas.microsoft.com/office/drawing/2014/main" id="{9D487A08-A405-5653-074D-6D5B5F8F0390}"/>
+              </a:ext>
+            </a:extLst>
+          </p:cNvPr>
+          <p:cNvCxnSpPr>
+            <a:cxnSpLocks/>
+          </p:cNvCxnSpPr>
+          <p:nvPr/>
+        </p:nvCxnSpPr>
+        <p:spPr>
+          <a:xfrm>
+            <a:off x="8083780" y="2534124"/>
+            <a:ext cx="0" cy="279356"/>
+          </a:xfrm>
+          <a:prstGeom prst="straightConnector1">
+            <a:avLst/>
+          </a:prstGeom>
+          <a:ln w="28575">
+            <a:solidFill>
+              <a:schemeClr val="accent6">
+                <a:lumMod val="75000"/>
+              </a:schemeClr>
+            </a:solidFill>
+            <a:tailEnd type="triangle"/>
+          </a:ln>
+        </p:spPr>
+        <p:style>
+          <a:lnRef idx="2">
+            <a:schemeClr val="accent1"/>
+          </a:lnRef>
+          <a:fillRef idx="0">
+            <a:schemeClr val="accent1"/>
+          </a:fillRef>
+          <a:effectRef idx="1">
+            <a:schemeClr val="accent1"/>
+          </a:effectRef>
+          <a:fontRef idx="minor">
+            <a:schemeClr val="tx1"/>
+          </a:fontRef>
+        </p:style>
+      </p:cxnSp>
+      <p:sp>
+        <p:nvSpPr>
+          <p:cNvPr id="25" name="Rectangle 24">
+            <a:extLst>
+              <a:ext uri="{FF2B5EF4-FFF2-40B4-BE49-F238E27FC236}">
+                <a16:creationId xmlns:a16="http://schemas.microsoft.com/office/drawing/2014/main" id="{6ABED042-A972-719D-FFBA-660D958A390D}"/>
+              </a:ext>
+            </a:extLst>
+          </p:cNvPr>
+          <p:cNvSpPr/>
+          <p:nvPr/>
+        </p:nvSpPr>
+        <p:spPr>
+          <a:xfrm>
+            <a:off x="7108801" y="2813480"/>
+            <a:ext cx="1641534" cy="418011"/>
+          </a:xfrm>
+          <a:prstGeom prst="rect">
+            <a:avLst/>
+          </a:prstGeom>
+          <a:solidFill>
+            <a:schemeClr val="accent6">
+              <a:lumMod val="40000"/>
+              <a:lumOff val="60000"/>
+            </a:schemeClr>
+          </a:solidFill>
+        </p:spPr>
+        <p:style>
+          <a:lnRef idx="2">
+            <a:schemeClr val="accent1">
+              <a:shade val="15000"/>
+            </a:schemeClr>
+          </a:lnRef>
+          <a:fillRef idx="1">
+            <a:schemeClr val="accent1"/>
+          </a:fillRef>
+          <a:effectRef idx="0">
+            <a:schemeClr val="accent1"/>
+          </a:effectRef>
+          <a:fontRef idx="minor">
+            <a:schemeClr val="lt1"/>
+          </a:fontRef>
+        </p:style>
+        <p:txBody>
+          <a:bodyPr rtlCol="0" anchor="ctr"/>
+          <a:lstStyle/>
+          <a:p>
+            <a:pPr algn="ctr"/>
+            <a:r>
+              <a:rPr lang="en-US" sz="1200" b="1" dirty="0">
+                <a:solidFill>
+                  <a:schemeClr val="tx1"/>
+                </a:solidFill>
+              </a:rPr>
+              <a:t> Encode bytes data sequence reversing</a:t>
+            </a:r>
+            <a:endParaRPr lang="en-SG" sz="1200" b="1" dirty="0">
+              <a:solidFill>
+                <a:schemeClr val="tx1"/>
+              </a:solidFill>
+            </a:endParaRPr>
+          </a:p>
+        </p:txBody>
+      </p:sp>
+      <p:sp>
+        <p:nvSpPr>
+          <p:cNvPr id="26" name="Rectangle 25">
+            <a:extLst>
+              <a:ext uri="{FF2B5EF4-FFF2-40B4-BE49-F238E27FC236}">
+                <a16:creationId xmlns:a16="http://schemas.microsoft.com/office/drawing/2014/main" id="{8AB79A20-C19A-F2B2-6977-988F861D5FD3}"/>
+              </a:ext>
+            </a:extLst>
+          </p:cNvPr>
+          <p:cNvSpPr/>
+          <p:nvPr/>
+        </p:nvSpPr>
+        <p:spPr>
+          <a:xfrm>
+            <a:off x="6345048" y="1366536"/>
+            <a:ext cx="2006498" cy="418011"/>
+          </a:xfrm>
+          <a:prstGeom prst="rect">
+            <a:avLst/>
+          </a:prstGeom>
+          <a:solidFill>
+            <a:schemeClr val="accent6">
+              <a:lumMod val="40000"/>
+              <a:lumOff val="60000"/>
+            </a:schemeClr>
+          </a:solidFill>
+        </p:spPr>
+        <p:style>
+          <a:lnRef idx="2">
+            <a:schemeClr val="accent1">
+              <a:shade val="15000"/>
+            </a:schemeClr>
+          </a:lnRef>
+          <a:fillRef idx="1">
+            <a:schemeClr val="accent1"/>
+          </a:fillRef>
+          <a:effectRef idx="0">
+            <a:schemeClr val="accent1"/>
+          </a:effectRef>
+          <a:fontRef idx="minor">
+            <a:schemeClr val="lt1"/>
+          </a:fontRef>
+        </p:style>
+        <p:txBody>
+          <a:bodyPr rtlCol="0" anchor="ctr"/>
+          <a:lstStyle/>
+          <a:p>
+            <a:pPr algn="ctr"/>
+            <a:r>
+              <a:rPr lang="en-US" sz="1200" b="1" dirty="0">
+                <a:solidFill>
+                  <a:schemeClr val="tx1"/>
+                </a:solidFill>
+              </a:rPr>
+              <a:t>Insert random-contents or dead-code </a:t>
+            </a:r>
+            <a:endParaRPr lang="en-SG" sz="1200" b="1" dirty="0">
+              <a:solidFill>
+                <a:schemeClr val="tx1"/>
+              </a:solidFill>
+            </a:endParaRPr>
+          </a:p>
+        </p:txBody>
+      </p:sp>
+      <p:cxnSp>
+        <p:nvCxnSpPr>
+          <p:cNvPr id="28" name="Straight Arrow Connector 27">
+            <a:extLst>
+              <a:ext uri="{FF2B5EF4-FFF2-40B4-BE49-F238E27FC236}">
+                <a16:creationId xmlns:a16="http://schemas.microsoft.com/office/drawing/2014/main" id="{8983C766-A00B-5B96-35D4-DB41D44487B3}"/>
+              </a:ext>
+            </a:extLst>
+          </p:cNvPr>
+          <p:cNvCxnSpPr>
+            <a:cxnSpLocks/>
+            <a:stCxn id="20" idx="3"/>
+            <a:endCxn id="22" idx="1"/>
+          </p:cNvCxnSpPr>
+          <p:nvPr/>
+        </p:nvCxnSpPr>
+        <p:spPr>
+          <a:xfrm flipV="1">
+            <a:off x="7180202" y="2325119"/>
+            <a:ext cx="336193" cy="0"/>
+          </a:xfrm>
+          <a:prstGeom prst="straightConnector1">
+            <a:avLst/>
+          </a:prstGeom>
+          <a:ln w="28575">
+            <a:solidFill>
+              <a:schemeClr val="accent6">
+                <a:lumMod val="75000"/>
+              </a:schemeClr>
+            </a:solidFill>
+            <a:tailEnd type="triangle"/>
+          </a:ln>
+        </p:spPr>
+        <p:style>
+          <a:lnRef idx="2">
+            <a:schemeClr val="accent1"/>
+          </a:lnRef>
+          <a:fillRef idx="0">
+            <a:schemeClr val="accent1"/>
+          </a:fillRef>
+          <a:effectRef idx="1">
+            <a:schemeClr val="accent1"/>
+          </a:effectRef>
+          <a:fontRef idx="minor">
+            <a:schemeClr val="tx1"/>
+          </a:fontRef>
+        </p:style>
+      </p:cxnSp>
+      <p:cxnSp>
+        <p:nvCxnSpPr>
+          <p:cNvPr id="33" name="Straight Arrow Connector 32">
+            <a:extLst>
+              <a:ext uri="{FF2B5EF4-FFF2-40B4-BE49-F238E27FC236}">
+                <a16:creationId xmlns:a16="http://schemas.microsoft.com/office/drawing/2014/main" id="{E1180D0B-879F-02F9-4BF1-3B0A00D5DC94}"/>
+              </a:ext>
+            </a:extLst>
+          </p:cNvPr>
+          <p:cNvCxnSpPr>
+            <a:cxnSpLocks/>
+          </p:cNvCxnSpPr>
+          <p:nvPr/>
+        </p:nvCxnSpPr>
+        <p:spPr>
+          <a:xfrm>
+            <a:off x="8750335" y="3002195"/>
+            <a:ext cx="281771" cy="0"/>
+          </a:xfrm>
+          <a:prstGeom prst="straightConnector1">
+            <a:avLst/>
+          </a:prstGeom>
+          <a:ln w="28575">
+            <a:solidFill>
+              <a:schemeClr val="accent6">
+                <a:lumMod val="75000"/>
+              </a:schemeClr>
+            </a:solidFill>
+            <a:tailEnd type="triangle"/>
+          </a:ln>
+        </p:spPr>
+        <p:style>
+          <a:lnRef idx="2">
+            <a:schemeClr val="accent1"/>
+          </a:lnRef>
+          <a:fillRef idx="0">
+            <a:schemeClr val="accent1"/>
+          </a:fillRef>
+          <a:effectRef idx="1">
+            <a:schemeClr val="accent1"/>
+          </a:effectRef>
+          <a:fontRef idx="minor">
+            <a:schemeClr val="tx1"/>
+          </a:fontRef>
+        </p:style>
+      </p:cxnSp>
+      <p:sp>
+        <p:nvSpPr>
+          <p:cNvPr id="35" name="Rectangle 34">
+            <a:extLst>
+              <a:ext uri="{FF2B5EF4-FFF2-40B4-BE49-F238E27FC236}">
+                <a16:creationId xmlns:a16="http://schemas.microsoft.com/office/drawing/2014/main" id="{3F01A159-0179-91E6-5CE1-07F0A748A040}"/>
+              </a:ext>
+            </a:extLst>
+          </p:cNvPr>
+          <p:cNvSpPr/>
+          <p:nvPr/>
+        </p:nvSpPr>
+        <p:spPr>
+          <a:xfrm>
+            <a:off x="9058760" y="2813480"/>
+            <a:ext cx="1333288" cy="418011"/>
+          </a:xfrm>
+          <a:prstGeom prst="rect">
+            <a:avLst/>
+          </a:prstGeom>
+          <a:solidFill>
+            <a:schemeClr val="accent6">
+              <a:lumMod val="40000"/>
+              <a:lumOff val="60000"/>
+            </a:schemeClr>
+          </a:solidFill>
+        </p:spPr>
+        <p:style>
+          <a:lnRef idx="2">
+            <a:schemeClr val="accent1">
+              <a:shade val="15000"/>
+            </a:schemeClr>
+          </a:lnRef>
+          <a:fillRef idx="1">
+            <a:schemeClr val="accent1"/>
+          </a:fillRef>
+          <a:effectRef idx="0">
+            <a:schemeClr val="accent1"/>
+          </a:effectRef>
+          <a:fontRef idx="minor">
+            <a:schemeClr val="lt1"/>
+          </a:fontRef>
+        </p:style>
+        <p:txBody>
+          <a:bodyPr rtlCol="0" anchor="ctr"/>
+          <a:lstStyle/>
+          <a:p>
+            <a:pPr algn="ctr"/>
+            <a:r>
+              <a:rPr lang="en-US" sz="1200" b="1" dirty="0">
+                <a:solidFill>
+                  <a:schemeClr val="tx1"/>
+                </a:solidFill>
+              </a:rPr>
+              <a:t>Packing code with header</a:t>
+            </a:r>
+            <a:endParaRPr lang="en-SG" sz="1200" b="1" dirty="0">
+              <a:solidFill>
+                <a:schemeClr val="tx1"/>
+              </a:solidFill>
+            </a:endParaRPr>
+          </a:p>
+        </p:txBody>
+      </p:sp>
+      <p:cxnSp>
+        <p:nvCxnSpPr>
+          <p:cNvPr id="36" name="Straight Arrow Connector 35">
+            <a:extLst>
+              <a:ext uri="{FF2B5EF4-FFF2-40B4-BE49-F238E27FC236}">
+                <a16:creationId xmlns:a16="http://schemas.microsoft.com/office/drawing/2014/main" id="{7275AC4F-7759-632A-274A-168C5ACFB105}"/>
+              </a:ext>
+            </a:extLst>
+          </p:cNvPr>
+          <p:cNvCxnSpPr>
+            <a:cxnSpLocks/>
+          </p:cNvCxnSpPr>
+          <p:nvPr/>
+        </p:nvCxnSpPr>
+        <p:spPr>
+          <a:xfrm>
+            <a:off x="9597679" y="3219039"/>
+            <a:ext cx="0" cy="491248"/>
+          </a:xfrm>
+          <a:prstGeom prst="straightConnector1">
+            <a:avLst/>
+          </a:prstGeom>
+          <a:ln w="28575">
+            <a:solidFill>
+              <a:schemeClr val="accent6">
+                <a:lumMod val="75000"/>
+              </a:schemeClr>
+            </a:solidFill>
+            <a:tailEnd type="triangle"/>
+          </a:ln>
+        </p:spPr>
+        <p:style>
+          <a:lnRef idx="2">
+            <a:schemeClr val="accent1"/>
+          </a:lnRef>
+          <a:fillRef idx="0">
+            <a:schemeClr val="accent1"/>
+          </a:fillRef>
+          <a:effectRef idx="1">
+            <a:schemeClr val="accent1"/>
+          </a:effectRef>
+          <a:fontRef idx="minor">
+            <a:schemeClr val="tx1"/>
+          </a:fontRef>
+        </p:style>
+      </p:cxnSp>
+      <p:pic>
+        <p:nvPicPr>
+          <p:cNvPr id="40" name="Picture 39">
+            <a:extLst>
+              <a:ext uri="{FF2B5EF4-FFF2-40B4-BE49-F238E27FC236}">
+                <a16:creationId xmlns:a16="http://schemas.microsoft.com/office/drawing/2014/main" id="{A9A9E4D7-E149-002A-2797-43335DDF9283}"/>
+              </a:ext>
+            </a:extLst>
+          </p:cNvPr>
+          <p:cNvPicPr>
+            <a:picLocks noChangeAspect="1"/>
+          </p:cNvPicPr>
+          <p:nvPr/>
+        </p:nvPicPr>
+        <p:blipFill>
+          <a:blip r:embed="rId4"/>
+          <a:stretch>
+            <a:fillRect/>
+          </a:stretch>
+        </p:blipFill>
+        <p:spPr>
+          <a:xfrm>
+            <a:off x="4918499" y="3710287"/>
+            <a:ext cx="6330562" cy="1412667"/>
+          </a:xfrm>
+          <a:prstGeom prst="rect">
+            <a:avLst/>
+          </a:prstGeom>
+        </p:spPr>
+      </p:pic>
+      <p:sp>
+        <p:nvSpPr>
+          <p:cNvPr id="42" name="TextBox 41">
+            <a:extLst>
+              <a:ext uri="{FF2B5EF4-FFF2-40B4-BE49-F238E27FC236}">
+                <a16:creationId xmlns:a16="http://schemas.microsoft.com/office/drawing/2014/main" id="{AE0DEBF3-66AD-D15C-E47F-256E6A9DE284}"/>
+              </a:ext>
+            </a:extLst>
+          </p:cNvPr>
+          <p:cNvSpPr txBox="1"/>
+          <p:nvPr/>
+        </p:nvSpPr>
+        <p:spPr>
+          <a:xfrm>
+            <a:off x="4822719" y="3433345"/>
+            <a:ext cx="3106849" cy="307777"/>
+          </a:xfrm>
+          <a:prstGeom prst="rect">
+            <a:avLst/>
+          </a:prstGeom>
+          <a:noFill/>
+        </p:spPr>
+        <p:txBody>
+          <a:bodyPr wrap="square" rtlCol="0">
+            <a:spAutoFit/>
+          </a:bodyPr>
+          <a:lstStyle/>
+          <a:p>
+            <a:r>
+              <a:rPr lang="en-US" sz="1400" b="1" dirty="0"/>
+              <a:t>Obfuscated Executable Code </a:t>
+            </a:r>
+            <a:endParaRPr lang="en-SG" sz="1400" b="1" dirty="0"/>
+          </a:p>
+        </p:txBody>
+      </p:sp>
+      <p:sp>
+        <p:nvSpPr>
+          <p:cNvPr id="44" name="Arrow: Down 43">
+            <a:extLst>
+              <a:ext uri="{FF2B5EF4-FFF2-40B4-BE49-F238E27FC236}">
+                <a16:creationId xmlns:a16="http://schemas.microsoft.com/office/drawing/2014/main" id="{9F16990D-08EF-D2B0-3D80-A8399E290120}"/>
+              </a:ext>
+            </a:extLst>
+          </p:cNvPr>
+          <p:cNvSpPr/>
+          <p:nvPr/>
+        </p:nvSpPr>
+        <p:spPr>
+          <a:xfrm>
+            <a:off x="7881488" y="5156235"/>
+            <a:ext cx="125824" cy="233253"/>
+          </a:xfrm>
+          <a:prstGeom prst="downArrow">
+            <a:avLst/>
+          </a:prstGeom>
+        </p:spPr>
+        <p:style>
+          <a:lnRef idx="2">
+            <a:schemeClr val="accent1">
+              <a:shade val="15000"/>
+            </a:schemeClr>
+          </a:lnRef>
+          <a:fillRef idx="1">
+            <a:schemeClr val="accent1"/>
+          </a:fillRef>
+          <a:effectRef idx="0">
+            <a:schemeClr val="accent1"/>
+          </a:effectRef>
+          <a:fontRef idx="minor">
+            <a:schemeClr val="lt1"/>
+          </a:fontRef>
+        </p:style>
+        <p:txBody>
+          <a:bodyPr rtlCol="0" anchor="ctr"/>
+          <a:lstStyle/>
+          <a:p>
+            <a:pPr algn="ctr"/>
+            <a:endParaRPr lang="en-SG"/>
+          </a:p>
+        </p:txBody>
+      </p:sp>
+      <p:sp>
+        <p:nvSpPr>
+          <p:cNvPr id="45" name="TextBox 44">
+            <a:extLst>
+              <a:ext uri="{FF2B5EF4-FFF2-40B4-BE49-F238E27FC236}">
+                <a16:creationId xmlns:a16="http://schemas.microsoft.com/office/drawing/2014/main" id="{9D46A031-3962-469B-757F-31DFCA78F74C}"/>
+              </a:ext>
+            </a:extLst>
+          </p:cNvPr>
+          <p:cNvSpPr txBox="1"/>
+          <p:nvPr/>
+        </p:nvSpPr>
+        <p:spPr>
+          <a:xfrm>
+            <a:off x="4897175" y="5132957"/>
+            <a:ext cx="3106849" cy="307777"/>
+          </a:xfrm>
+          <a:prstGeom prst="rect">
+            <a:avLst/>
+          </a:prstGeom>
+          <a:noFill/>
+        </p:spPr>
+        <p:txBody>
+          <a:bodyPr wrap="square" rtlCol="0">
+            <a:spAutoFit/>
+          </a:bodyPr>
+          <a:lstStyle/>
+          <a:p>
+            <a:r>
+              <a:rPr lang="en-US" sz="1400" b="1" dirty="0">
+                <a:solidFill>
+                  <a:schemeClr val="accent1"/>
+                </a:solidFill>
+              </a:rPr>
+              <a:t>Execute the obfuscated code </a:t>
+            </a:r>
+            <a:endParaRPr lang="en-SG" sz="1400" b="1" dirty="0">
+              <a:solidFill>
+                <a:schemeClr val="accent1"/>
+              </a:solidFill>
+            </a:endParaRPr>
+          </a:p>
+        </p:txBody>
+      </p:sp>
+      <p:pic>
+        <p:nvPicPr>
+          <p:cNvPr id="47" name="Picture 46">
+            <a:extLst>
+              <a:ext uri="{FF2B5EF4-FFF2-40B4-BE49-F238E27FC236}">
+                <a16:creationId xmlns:a16="http://schemas.microsoft.com/office/drawing/2014/main" id="{FB660AAA-2F45-DA6C-7B90-EDE44DC8E32D}"/>
+              </a:ext>
+            </a:extLst>
+          </p:cNvPr>
+          <p:cNvPicPr>
+            <a:picLocks noChangeAspect="1"/>
+          </p:cNvPicPr>
+          <p:nvPr/>
+        </p:nvPicPr>
+        <p:blipFill rotWithShape="1">
+          <a:blip r:embed="rId5"/>
+          <a:srcRect b="28340"/>
+          <a:stretch/>
+        </p:blipFill>
+        <p:spPr>
+          <a:xfrm>
+            <a:off x="4975892" y="5430732"/>
+            <a:ext cx="4744809" cy="602154"/>
+          </a:xfrm>
+          <a:prstGeom prst="rect">
+            <a:avLst/>
+          </a:prstGeom>
+        </p:spPr>
+      </p:pic>
+      <p:cxnSp>
+        <p:nvCxnSpPr>
+          <p:cNvPr id="48" name="Straight Arrow Connector 47">
+            <a:extLst>
+              <a:ext uri="{FF2B5EF4-FFF2-40B4-BE49-F238E27FC236}">
+                <a16:creationId xmlns:a16="http://schemas.microsoft.com/office/drawing/2014/main" id="{57F3D3F5-DB26-AF0C-EA00-B9980EEEA654}"/>
+              </a:ext>
+            </a:extLst>
+          </p:cNvPr>
+          <p:cNvCxnSpPr>
+            <a:cxnSpLocks/>
+          </p:cNvCxnSpPr>
+          <p:nvPr/>
+        </p:nvCxnSpPr>
+        <p:spPr>
+          <a:xfrm flipH="1">
+            <a:off x="4429766" y="5032124"/>
+            <a:ext cx="467409" cy="0"/>
+          </a:xfrm>
+          <a:prstGeom prst="straightConnector1">
+            <a:avLst/>
+          </a:prstGeom>
+          <a:ln w="28575">
+            <a:solidFill>
+              <a:schemeClr val="accent2">
+                <a:lumMod val="75000"/>
+              </a:schemeClr>
+            </a:solidFill>
+            <a:tailEnd type="triangle"/>
+          </a:ln>
+        </p:spPr>
+        <p:style>
+          <a:lnRef idx="2">
+            <a:schemeClr val="accent1"/>
+          </a:lnRef>
+          <a:fillRef idx="0">
+            <a:schemeClr val="accent1"/>
+          </a:fillRef>
+          <a:effectRef idx="1">
+            <a:schemeClr val="accent1"/>
+          </a:effectRef>
+          <a:fontRef idx="minor">
+            <a:schemeClr val="tx1"/>
+          </a:fontRef>
+        </p:style>
+      </p:cxnSp>
+      <p:sp>
+        <p:nvSpPr>
+          <p:cNvPr id="50" name="Rectangle 49">
+            <a:extLst>
+              <a:ext uri="{FF2B5EF4-FFF2-40B4-BE49-F238E27FC236}">
+                <a16:creationId xmlns:a16="http://schemas.microsoft.com/office/drawing/2014/main" id="{1C4200A3-7045-3BBF-C1FB-9EE5F71ACBF9}"/>
+              </a:ext>
+            </a:extLst>
+          </p:cNvPr>
+          <p:cNvSpPr/>
+          <p:nvPr/>
+        </p:nvSpPr>
+        <p:spPr>
+          <a:xfrm>
+            <a:off x="3325586" y="4833631"/>
+            <a:ext cx="1092588" cy="418011"/>
+          </a:xfrm>
+          <a:prstGeom prst="rect">
+            <a:avLst/>
+          </a:prstGeom>
+          <a:solidFill>
+            <a:schemeClr val="accent2">
+              <a:lumMod val="40000"/>
+              <a:lumOff val="60000"/>
+            </a:schemeClr>
+          </a:solidFill>
+        </p:spPr>
+        <p:style>
+          <a:lnRef idx="2">
+            <a:schemeClr val="accent1">
+              <a:shade val="15000"/>
+            </a:schemeClr>
+          </a:lnRef>
+          <a:fillRef idx="1">
+            <a:schemeClr val="accent1"/>
+          </a:fillRef>
+          <a:effectRef idx="0">
+            <a:schemeClr val="accent1"/>
+          </a:effectRef>
+          <a:fontRef idx="minor">
+            <a:schemeClr val="lt1"/>
+          </a:fontRef>
+        </p:style>
+        <p:txBody>
+          <a:bodyPr rtlCol="0" anchor="ctr"/>
+          <a:lstStyle/>
+          <a:p>
+            <a:pPr algn="ctr"/>
+            <a:r>
+              <a:rPr lang="en-US" sz="1200" b="1" dirty="0">
+                <a:solidFill>
+                  <a:schemeClr val="tx1"/>
+                </a:solidFill>
+              </a:rPr>
+              <a:t>Unpacking code bytes </a:t>
+            </a:r>
+            <a:endParaRPr lang="en-SG" sz="1200" b="1" dirty="0">
+              <a:solidFill>
+                <a:schemeClr val="tx1"/>
+              </a:solidFill>
+            </a:endParaRPr>
+          </a:p>
+        </p:txBody>
+      </p:sp>
+      <p:sp>
+        <p:nvSpPr>
+          <p:cNvPr id="52" name="Rectangle 51">
+            <a:extLst>
+              <a:ext uri="{FF2B5EF4-FFF2-40B4-BE49-F238E27FC236}">
+                <a16:creationId xmlns:a16="http://schemas.microsoft.com/office/drawing/2014/main" id="{119F77DD-E16B-18A4-FF2A-F080EA4C64A2}"/>
+              </a:ext>
+            </a:extLst>
+          </p:cNvPr>
+          <p:cNvSpPr/>
+          <p:nvPr/>
+        </p:nvSpPr>
+        <p:spPr>
+          <a:xfrm>
+            <a:off x="1158852" y="4823119"/>
+            <a:ext cx="1863862" cy="418011"/>
+          </a:xfrm>
+          <a:prstGeom prst="rect">
+            <a:avLst/>
+          </a:prstGeom>
+          <a:solidFill>
+            <a:schemeClr val="accent2">
+              <a:lumMod val="40000"/>
+              <a:lumOff val="60000"/>
+            </a:schemeClr>
+          </a:solidFill>
+        </p:spPr>
+        <p:style>
+          <a:lnRef idx="2">
+            <a:schemeClr val="accent1">
+              <a:shade val="15000"/>
+            </a:schemeClr>
+          </a:lnRef>
+          <a:fillRef idx="1">
+            <a:schemeClr val="accent1"/>
+          </a:fillRef>
+          <a:effectRef idx="0">
+            <a:schemeClr val="accent1"/>
+          </a:effectRef>
+          <a:fontRef idx="minor">
+            <a:schemeClr val="lt1"/>
+          </a:fontRef>
+        </p:style>
+        <p:txBody>
+          <a:bodyPr rtlCol="0" anchor="ctr"/>
+          <a:lstStyle/>
+          <a:p>
+            <a:pPr algn="ctr"/>
+            <a:r>
+              <a:rPr lang="en-US" sz="1200" b="1" dirty="0">
+                <a:solidFill>
+                  <a:schemeClr val="tx1"/>
+                </a:solidFill>
+              </a:rPr>
+              <a:t>Encode bytes data sequence reversing</a:t>
+            </a:r>
+            <a:endParaRPr lang="en-SG" sz="1200" b="1" dirty="0">
+              <a:solidFill>
+                <a:schemeClr val="tx1"/>
+              </a:solidFill>
+            </a:endParaRPr>
+          </a:p>
+        </p:txBody>
+      </p:sp>
+      <p:cxnSp>
+        <p:nvCxnSpPr>
+          <p:cNvPr id="53" name="Straight Arrow Connector 52">
+            <a:extLst>
+              <a:ext uri="{FF2B5EF4-FFF2-40B4-BE49-F238E27FC236}">
+                <a16:creationId xmlns:a16="http://schemas.microsoft.com/office/drawing/2014/main" id="{B7CFE80F-7A3F-A338-F05C-FB5B27CEB277}"/>
+              </a:ext>
+            </a:extLst>
+          </p:cNvPr>
+          <p:cNvCxnSpPr>
+            <a:cxnSpLocks/>
+          </p:cNvCxnSpPr>
+          <p:nvPr/>
+        </p:nvCxnSpPr>
+        <p:spPr>
+          <a:xfrm flipH="1">
+            <a:off x="3020172" y="5032124"/>
+            <a:ext cx="305414" cy="0"/>
+          </a:xfrm>
+          <a:prstGeom prst="straightConnector1">
+            <a:avLst/>
+          </a:prstGeom>
+          <a:ln w="28575">
+            <a:solidFill>
+              <a:schemeClr val="accent2">
+                <a:lumMod val="75000"/>
+              </a:schemeClr>
+            </a:solidFill>
+            <a:tailEnd type="triangle"/>
+          </a:ln>
+        </p:spPr>
+        <p:style>
+          <a:lnRef idx="2">
+            <a:schemeClr val="accent1"/>
+          </a:lnRef>
+          <a:fillRef idx="0">
+            <a:schemeClr val="accent1"/>
+          </a:fillRef>
+          <a:effectRef idx="1">
+            <a:schemeClr val="accent1"/>
+          </a:effectRef>
+          <a:fontRef idx="minor">
+            <a:schemeClr val="tx1"/>
+          </a:fontRef>
+        </p:style>
+      </p:cxnSp>
+      <p:sp>
+        <p:nvSpPr>
+          <p:cNvPr id="56" name="Rectangle 55">
+            <a:extLst>
+              <a:ext uri="{FF2B5EF4-FFF2-40B4-BE49-F238E27FC236}">
+                <a16:creationId xmlns:a16="http://schemas.microsoft.com/office/drawing/2014/main" id="{F8C0B05C-81AF-B3F7-7AE2-56EA518ED366}"/>
+              </a:ext>
+            </a:extLst>
+          </p:cNvPr>
+          <p:cNvSpPr/>
+          <p:nvPr/>
+        </p:nvSpPr>
+        <p:spPr>
+          <a:xfrm>
+            <a:off x="2610236" y="4143389"/>
+            <a:ext cx="1612862" cy="418011"/>
+          </a:xfrm>
+          <a:prstGeom prst="rect">
+            <a:avLst/>
+          </a:prstGeom>
+          <a:solidFill>
+            <a:schemeClr val="accent2">
+              <a:lumMod val="40000"/>
+              <a:lumOff val="60000"/>
+            </a:schemeClr>
+          </a:solidFill>
+        </p:spPr>
+        <p:style>
+          <a:lnRef idx="2">
+            <a:schemeClr val="accent1">
+              <a:shade val="15000"/>
+            </a:schemeClr>
+          </a:lnRef>
+          <a:fillRef idx="1">
+            <a:schemeClr val="accent1"/>
+          </a:fillRef>
+          <a:effectRef idx="0">
+            <a:schemeClr val="accent1"/>
+          </a:effectRef>
+          <a:fontRef idx="minor">
+            <a:schemeClr val="lt1"/>
+          </a:fontRef>
+        </p:style>
+        <p:txBody>
+          <a:bodyPr rtlCol="0" anchor="ctr"/>
+          <a:lstStyle/>
+          <a:p>
+            <a:pPr algn="ctr"/>
+            <a:r>
+              <a:rPr lang="en-US" sz="1200" b="1" dirty="0">
+                <a:solidFill>
+                  <a:schemeClr val="tx1"/>
+                </a:solidFill>
+              </a:rPr>
+              <a:t> Code content B64 decode</a:t>
+            </a:r>
+            <a:endParaRPr lang="en-SG" sz="1200" b="1" dirty="0">
+              <a:solidFill>
+                <a:schemeClr val="tx1"/>
+              </a:solidFill>
+            </a:endParaRPr>
+          </a:p>
+        </p:txBody>
+      </p:sp>
+      <p:cxnSp>
+        <p:nvCxnSpPr>
+          <p:cNvPr id="57" name="Straight Arrow Connector 56">
+            <a:extLst>
+              <a:ext uri="{FF2B5EF4-FFF2-40B4-BE49-F238E27FC236}">
+                <a16:creationId xmlns:a16="http://schemas.microsoft.com/office/drawing/2014/main" id="{405A43B6-9363-7E99-FA9B-63E206B34B74}"/>
+              </a:ext>
+            </a:extLst>
+          </p:cNvPr>
+          <p:cNvCxnSpPr>
+            <a:cxnSpLocks/>
+          </p:cNvCxnSpPr>
+          <p:nvPr/>
+        </p:nvCxnSpPr>
+        <p:spPr>
+          <a:xfrm flipV="1">
+            <a:off x="2833415" y="4571912"/>
+            <a:ext cx="0" cy="251207"/>
+          </a:xfrm>
+          <a:prstGeom prst="straightConnector1">
+            <a:avLst/>
+          </a:prstGeom>
+          <a:ln w="28575">
+            <a:solidFill>
+              <a:schemeClr val="accent2">
+                <a:lumMod val="75000"/>
+              </a:schemeClr>
+            </a:solidFill>
+            <a:tailEnd type="triangle"/>
+          </a:ln>
+        </p:spPr>
+        <p:style>
+          <a:lnRef idx="2">
+            <a:schemeClr val="accent1"/>
+          </a:lnRef>
+          <a:fillRef idx="0">
+            <a:schemeClr val="accent1"/>
+          </a:fillRef>
+          <a:effectRef idx="1">
+            <a:schemeClr val="accent1"/>
+          </a:effectRef>
+          <a:fontRef idx="minor">
+            <a:schemeClr val="tx1"/>
+          </a:fontRef>
+        </p:style>
+      </p:cxnSp>
+      <p:cxnSp>
+        <p:nvCxnSpPr>
+          <p:cNvPr id="60" name="Straight Arrow Connector 59">
+            <a:extLst>
+              <a:ext uri="{FF2B5EF4-FFF2-40B4-BE49-F238E27FC236}">
+                <a16:creationId xmlns:a16="http://schemas.microsoft.com/office/drawing/2014/main" id="{3D279AD0-3816-55CB-E875-6D78B4C06D50}"/>
+              </a:ext>
+            </a:extLst>
+          </p:cNvPr>
+          <p:cNvCxnSpPr>
+            <a:cxnSpLocks/>
+          </p:cNvCxnSpPr>
+          <p:nvPr/>
+        </p:nvCxnSpPr>
+        <p:spPr>
+          <a:xfrm flipH="1">
+            <a:off x="2257022" y="4352394"/>
+            <a:ext cx="353214" cy="0"/>
+          </a:xfrm>
+          <a:prstGeom prst="straightConnector1">
+            <a:avLst/>
+          </a:prstGeom>
+          <a:ln w="28575">
+            <a:solidFill>
+              <a:schemeClr val="accent2">
+                <a:lumMod val="75000"/>
+              </a:schemeClr>
+            </a:solidFill>
+            <a:tailEnd type="triangle"/>
+          </a:ln>
+        </p:spPr>
+        <p:style>
+          <a:lnRef idx="2">
+            <a:schemeClr val="accent1"/>
+          </a:lnRef>
+          <a:fillRef idx="0">
+            <a:schemeClr val="accent1"/>
+          </a:fillRef>
+          <a:effectRef idx="1">
+            <a:schemeClr val="accent1"/>
+          </a:effectRef>
+          <a:fontRef idx="minor">
+            <a:schemeClr val="tx1"/>
+          </a:fontRef>
+        </p:style>
+      </p:cxnSp>
+      <p:sp>
+        <p:nvSpPr>
+          <p:cNvPr id="62" name="Rectangle 61">
+            <a:extLst>
+              <a:ext uri="{FF2B5EF4-FFF2-40B4-BE49-F238E27FC236}">
+                <a16:creationId xmlns:a16="http://schemas.microsoft.com/office/drawing/2014/main" id="{9853FA85-7DB3-3966-907C-0DB0015C8EB0}"/>
+              </a:ext>
+            </a:extLst>
+          </p:cNvPr>
+          <p:cNvSpPr/>
+          <p:nvPr/>
+        </p:nvSpPr>
+        <p:spPr>
+          <a:xfrm>
+            <a:off x="1158852" y="4143388"/>
+            <a:ext cx="1098170" cy="418011"/>
+          </a:xfrm>
+          <a:prstGeom prst="rect">
+            <a:avLst/>
+          </a:prstGeom>
+          <a:solidFill>
+            <a:schemeClr val="accent2">
+              <a:lumMod val="40000"/>
+              <a:lumOff val="60000"/>
+            </a:schemeClr>
+          </a:solidFill>
+        </p:spPr>
+        <p:style>
+          <a:lnRef idx="2">
+            <a:schemeClr val="accent1">
+              <a:shade val="15000"/>
+            </a:schemeClr>
+          </a:lnRef>
+          <a:fillRef idx="1">
+            <a:schemeClr val="accent1"/>
+          </a:fillRef>
+          <a:effectRef idx="0">
+            <a:schemeClr val="accent1"/>
+          </a:effectRef>
+          <a:fontRef idx="minor">
+            <a:schemeClr val="lt1"/>
+          </a:fontRef>
+        </p:style>
+        <p:txBody>
+          <a:bodyPr rtlCol="0" anchor="ctr"/>
+          <a:lstStyle/>
+          <a:p>
+            <a:pPr algn="ctr"/>
+            <a:r>
+              <a:rPr lang="en-US" sz="1200" b="1" dirty="0">
+                <a:solidFill>
+                  <a:schemeClr val="tx1"/>
+                </a:solidFill>
+              </a:rPr>
+              <a:t> Code string decompress </a:t>
+            </a:r>
+            <a:endParaRPr lang="en-SG" sz="1200" b="1" dirty="0">
+              <a:solidFill>
+                <a:schemeClr val="tx1"/>
+              </a:solidFill>
+            </a:endParaRPr>
+          </a:p>
+        </p:txBody>
+      </p:sp>
+      <p:cxnSp>
+        <p:nvCxnSpPr>
+          <p:cNvPr id="63" name="Straight Arrow Connector 62">
+            <a:extLst>
+              <a:ext uri="{FF2B5EF4-FFF2-40B4-BE49-F238E27FC236}">
+                <a16:creationId xmlns:a16="http://schemas.microsoft.com/office/drawing/2014/main" id="{266EE59F-64CE-28E3-1DC8-5A86A21C9D8B}"/>
+              </a:ext>
+            </a:extLst>
+          </p:cNvPr>
+          <p:cNvCxnSpPr>
+            <a:cxnSpLocks/>
+          </p:cNvCxnSpPr>
+          <p:nvPr/>
+        </p:nvCxnSpPr>
+        <p:spPr>
+          <a:xfrm flipV="1">
+            <a:off x="1707937" y="3865907"/>
+            <a:ext cx="0" cy="277481"/>
+          </a:xfrm>
+          <a:prstGeom prst="straightConnector1">
+            <a:avLst/>
+          </a:prstGeom>
+          <a:ln w="28575">
+            <a:solidFill>
+              <a:schemeClr val="accent2">
+                <a:lumMod val="75000"/>
+              </a:schemeClr>
+            </a:solidFill>
+            <a:tailEnd type="triangle"/>
+          </a:ln>
+        </p:spPr>
+        <p:style>
+          <a:lnRef idx="2">
+            <a:schemeClr val="accent1"/>
+          </a:lnRef>
+          <a:fillRef idx="0">
+            <a:schemeClr val="accent1"/>
+          </a:fillRef>
+          <a:effectRef idx="1">
+            <a:schemeClr val="accent1"/>
+          </a:effectRef>
+          <a:fontRef idx="minor">
+            <a:schemeClr val="tx1"/>
+          </a:fontRef>
+        </p:style>
+      </p:cxnSp>
+      <p:sp>
+        <p:nvSpPr>
+          <p:cNvPr id="66" name="Rectangle 65">
+            <a:extLst>
+              <a:ext uri="{FF2B5EF4-FFF2-40B4-BE49-F238E27FC236}">
+                <a16:creationId xmlns:a16="http://schemas.microsoft.com/office/drawing/2014/main" id="{7E1B9C8D-C933-1C13-BC70-29373F73B8B7}"/>
+              </a:ext>
+            </a:extLst>
+          </p:cNvPr>
+          <p:cNvSpPr/>
+          <p:nvPr/>
+        </p:nvSpPr>
+        <p:spPr>
+          <a:xfrm>
+            <a:off x="1158852" y="3433345"/>
+            <a:ext cx="2082964" cy="418011"/>
+          </a:xfrm>
+          <a:prstGeom prst="rect">
+            <a:avLst/>
+          </a:prstGeom>
+          <a:solidFill>
+            <a:schemeClr val="accent2">
+              <a:lumMod val="40000"/>
+              <a:lumOff val="60000"/>
+            </a:schemeClr>
+          </a:solidFill>
+        </p:spPr>
+        <p:style>
+          <a:lnRef idx="2">
+            <a:schemeClr val="accent1">
+              <a:shade val="15000"/>
+            </a:schemeClr>
+          </a:lnRef>
+          <a:fillRef idx="1">
+            <a:schemeClr val="accent1"/>
+          </a:fillRef>
+          <a:effectRef idx="0">
+            <a:schemeClr val="accent1"/>
+          </a:effectRef>
+          <a:fontRef idx="minor">
+            <a:schemeClr val="lt1"/>
+          </a:fontRef>
+        </p:style>
+        <p:txBody>
+          <a:bodyPr rtlCol="0" anchor="ctr"/>
+          <a:lstStyle/>
+          <a:p>
+            <a:pPr algn="ctr"/>
+            <a:r>
+              <a:rPr lang="en-US" sz="1200" b="1" dirty="0">
+                <a:solidFill>
+                  <a:schemeClr val="tx1"/>
+                </a:solidFill>
+              </a:rPr>
+              <a:t>Clean added dead-code and random-contents</a:t>
+            </a:r>
+            <a:endParaRPr lang="en-SG" sz="1200" b="1" dirty="0">
+              <a:solidFill>
+                <a:schemeClr val="tx1"/>
+              </a:solidFill>
+            </a:endParaRPr>
+          </a:p>
+        </p:txBody>
+      </p:sp>
+      <p:cxnSp>
+        <p:nvCxnSpPr>
+          <p:cNvPr id="67" name="Straight Arrow Connector 66">
+            <a:extLst>
+              <a:ext uri="{FF2B5EF4-FFF2-40B4-BE49-F238E27FC236}">
+                <a16:creationId xmlns:a16="http://schemas.microsoft.com/office/drawing/2014/main" id="{385009FE-49AE-1ADA-6AC0-4BBB3D0BD00E}"/>
+              </a:ext>
+            </a:extLst>
+          </p:cNvPr>
+          <p:cNvCxnSpPr>
+            <a:cxnSpLocks/>
+          </p:cNvCxnSpPr>
+          <p:nvPr/>
+        </p:nvCxnSpPr>
+        <p:spPr>
+          <a:xfrm flipH="1" flipV="1">
+            <a:off x="1694625" y="2905615"/>
+            <a:ext cx="0" cy="490468"/>
+          </a:xfrm>
+          <a:prstGeom prst="straightConnector1">
+            <a:avLst/>
+          </a:prstGeom>
+          <a:ln w="28575">
+            <a:solidFill>
+              <a:schemeClr val="accent2">
+                <a:lumMod val="75000"/>
+              </a:schemeClr>
+            </a:solidFill>
+            <a:tailEnd type="triangle"/>
+          </a:ln>
+        </p:spPr>
+        <p:style>
+          <a:lnRef idx="2">
+            <a:schemeClr val="accent1"/>
+          </a:lnRef>
+          <a:fillRef idx="0">
+            <a:schemeClr val="accent1"/>
+          </a:fillRef>
+          <a:effectRef idx="1">
+            <a:schemeClr val="accent1"/>
+          </a:effectRef>
+          <a:fontRef idx="minor">
+            <a:schemeClr val="tx1"/>
+          </a:fontRef>
+        </p:style>
+      </p:cxnSp>
+      <p:sp>
+        <p:nvSpPr>
+          <p:cNvPr id="69" name="Rectangle 68">
+            <a:extLst>
+              <a:ext uri="{FF2B5EF4-FFF2-40B4-BE49-F238E27FC236}">
+                <a16:creationId xmlns:a16="http://schemas.microsoft.com/office/drawing/2014/main" id="{A55D0C4E-1B8B-19AA-1813-311FD8CE3000}"/>
+              </a:ext>
+            </a:extLst>
+          </p:cNvPr>
+          <p:cNvSpPr/>
+          <p:nvPr/>
+        </p:nvSpPr>
+        <p:spPr>
+          <a:xfrm>
+            <a:off x="4333387" y="1277961"/>
+            <a:ext cx="6330560" cy="2118122"/>
+          </a:xfrm>
+          <a:prstGeom prst="rect">
+            <a:avLst/>
+          </a:prstGeom>
+          <a:noFill/>
+          <a:ln>
+            <a:solidFill>
+              <a:schemeClr val="accent6">
+                <a:lumMod val="75000"/>
+              </a:schemeClr>
+            </a:solidFill>
+            <a:prstDash val="sysDash"/>
+          </a:ln>
+        </p:spPr>
+        <p:style>
+          <a:lnRef idx="2">
+            <a:schemeClr val="accent1">
+              <a:shade val="15000"/>
+            </a:schemeClr>
+          </a:lnRef>
+          <a:fillRef idx="1">
+            <a:schemeClr val="accent1"/>
+          </a:fillRef>
+          <a:effectRef idx="0">
+            <a:schemeClr val="accent1"/>
+          </a:effectRef>
+          <a:fontRef idx="minor">
+            <a:schemeClr val="lt1"/>
+          </a:fontRef>
+        </p:style>
+        <p:txBody>
+          <a:bodyPr rtlCol="0" anchor="ctr"/>
+          <a:lstStyle/>
+          <a:p>
+            <a:pPr algn="ctr"/>
+            <a:endParaRPr lang="en-SG" dirty="0"/>
+          </a:p>
+        </p:txBody>
+      </p:sp>
+      <p:sp>
+        <p:nvSpPr>
+          <p:cNvPr id="72" name="TextBox 71">
+            <a:extLst>
+              <a:ext uri="{FF2B5EF4-FFF2-40B4-BE49-F238E27FC236}">
+                <a16:creationId xmlns:a16="http://schemas.microsoft.com/office/drawing/2014/main" id="{6BEE5AD4-6783-80B4-D7BF-E48728DEA7A6}"/>
+              </a:ext>
+            </a:extLst>
+          </p:cNvPr>
+          <p:cNvSpPr txBox="1"/>
+          <p:nvPr/>
+        </p:nvSpPr>
+        <p:spPr>
+          <a:xfrm>
+            <a:off x="5114909" y="2730002"/>
+            <a:ext cx="1951801" cy="523220"/>
+          </a:xfrm>
+          <a:prstGeom prst="rect">
+            <a:avLst/>
+          </a:prstGeom>
+          <a:noFill/>
+        </p:spPr>
+        <p:txBody>
+          <a:bodyPr wrap="square" rtlCol="0">
+            <a:spAutoFit/>
+          </a:bodyPr>
+          <a:lstStyle/>
+          <a:p>
+            <a:r>
+              <a:rPr lang="en-US" sz="1400" b="1" dirty="0">
+                <a:solidFill>
+                  <a:schemeClr val="accent6">
+                    <a:lumMod val="75000"/>
+                  </a:schemeClr>
+                </a:solidFill>
+              </a:rPr>
+              <a:t>Python Obfuscation Encoder</a:t>
+            </a:r>
+            <a:endParaRPr lang="en-SG" sz="1400" b="1" dirty="0">
+              <a:solidFill>
+                <a:schemeClr val="accent6">
+                  <a:lumMod val="75000"/>
+                </a:schemeClr>
+              </a:solidFill>
+            </a:endParaRPr>
+          </a:p>
+        </p:txBody>
+      </p:sp>
+      <p:sp>
+        <p:nvSpPr>
+          <p:cNvPr id="73" name="Rectangle 72">
+            <a:extLst>
+              <a:ext uri="{FF2B5EF4-FFF2-40B4-BE49-F238E27FC236}">
+                <a16:creationId xmlns:a16="http://schemas.microsoft.com/office/drawing/2014/main" id="{AA5EA2B8-8217-1F8F-E41C-B7846B11A9C5}"/>
+              </a:ext>
+            </a:extLst>
+          </p:cNvPr>
+          <p:cNvSpPr/>
+          <p:nvPr/>
+        </p:nvSpPr>
+        <p:spPr>
+          <a:xfrm>
+            <a:off x="894712" y="3307952"/>
+            <a:ext cx="3645689" cy="2340858"/>
+          </a:xfrm>
+          <a:prstGeom prst="rect">
+            <a:avLst/>
+          </a:prstGeom>
+          <a:noFill/>
+          <a:ln>
+            <a:solidFill>
+              <a:schemeClr val="accent2">
+                <a:lumMod val="75000"/>
+              </a:schemeClr>
+            </a:solidFill>
+            <a:prstDash val="sysDash"/>
+          </a:ln>
+        </p:spPr>
+        <p:style>
+          <a:lnRef idx="2">
+            <a:schemeClr val="accent1">
+              <a:shade val="15000"/>
+            </a:schemeClr>
+          </a:lnRef>
+          <a:fillRef idx="1">
+            <a:schemeClr val="accent1"/>
+          </a:fillRef>
+          <a:effectRef idx="0">
+            <a:schemeClr val="accent1"/>
+          </a:effectRef>
+          <a:fontRef idx="minor">
+            <a:schemeClr val="lt1"/>
+          </a:fontRef>
+        </p:style>
+        <p:txBody>
+          <a:bodyPr rtlCol="0" anchor="ctr"/>
+          <a:lstStyle/>
+          <a:p>
+            <a:pPr algn="ctr"/>
+            <a:endParaRPr lang="en-SG" dirty="0"/>
+          </a:p>
+        </p:txBody>
+      </p:sp>
+      <p:sp>
+        <p:nvSpPr>
+          <p:cNvPr id="75" name="TextBox 74">
+            <a:extLst>
+              <a:ext uri="{FF2B5EF4-FFF2-40B4-BE49-F238E27FC236}">
+                <a16:creationId xmlns:a16="http://schemas.microsoft.com/office/drawing/2014/main" id="{4482266B-AB07-8CE3-D419-F2C6A7F4B777}"/>
+              </a:ext>
+            </a:extLst>
+          </p:cNvPr>
+          <p:cNvSpPr txBox="1"/>
+          <p:nvPr/>
+        </p:nvSpPr>
+        <p:spPr>
+          <a:xfrm>
+            <a:off x="922904" y="5359472"/>
+            <a:ext cx="2675753" cy="307777"/>
+          </a:xfrm>
+          <a:prstGeom prst="rect">
+            <a:avLst/>
+          </a:prstGeom>
+          <a:noFill/>
+        </p:spPr>
+        <p:txBody>
+          <a:bodyPr wrap="square" rtlCol="0">
+            <a:spAutoFit/>
+          </a:bodyPr>
+          <a:lstStyle/>
+          <a:p>
+            <a:r>
+              <a:rPr lang="en-US" sz="1400" b="1" dirty="0">
+                <a:solidFill>
+                  <a:schemeClr val="accent2">
+                    <a:lumMod val="75000"/>
+                  </a:schemeClr>
+                </a:solidFill>
+              </a:rPr>
+              <a:t>Python Obfuscation Decoder</a:t>
+            </a:r>
+            <a:endParaRPr lang="en-SG" sz="1400" b="1" dirty="0">
+              <a:solidFill>
+                <a:schemeClr val="accent2">
+                  <a:lumMod val="75000"/>
+                </a:schemeClr>
+              </a:solidFill>
+            </a:endParaRPr>
+          </a:p>
+        </p:txBody>
+      </p:sp>
+      <p:pic>
+        <p:nvPicPr>
+          <p:cNvPr id="78" name="Picture 77" descr="A diagram of a program code&#10;&#10;Description automatically generated">
+            <a:extLst>
+              <a:ext uri="{FF2B5EF4-FFF2-40B4-BE49-F238E27FC236}">
+                <a16:creationId xmlns:a16="http://schemas.microsoft.com/office/drawing/2014/main" id="{32180DBC-1E29-DA6E-B161-E7C53D814D14}"/>
+              </a:ext>
+            </a:extLst>
+          </p:cNvPr>
+          <p:cNvPicPr>
+            <a:picLocks noChangeAspect="1"/>
+          </p:cNvPicPr>
+          <p:nvPr/>
+        </p:nvPicPr>
+        <p:blipFill>
+          <a:blip r:embed="rId6">
+            <a:extLst>
+              <a:ext uri="{28A0092B-C50C-407E-A947-70E740481C1C}">
+                <a14:useLocalDpi xmlns:a14="http://schemas.microsoft.com/office/drawing/2010/main" val="0"/>
+              </a:ext>
+            </a:extLst>
+          </a:blip>
+          <a:stretch>
+            <a:fillRect/>
+          </a:stretch>
+        </p:blipFill>
+        <p:spPr>
+          <a:xfrm>
+            <a:off x="3789308" y="2825783"/>
+            <a:ext cx="1105701" cy="927460"/>
+          </a:xfrm>
+          <a:prstGeom prst="rect">
+            <a:avLst/>
+          </a:prstGeom>
+        </p:spPr>
+      </p:pic>
+      <p:sp>
+        <p:nvSpPr>
+          <p:cNvPr id="80" name="TextBox 79">
+            <a:extLst>
+              <a:ext uri="{FF2B5EF4-FFF2-40B4-BE49-F238E27FC236}">
+                <a16:creationId xmlns:a16="http://schemas.microsoft.com/office/drawing/2014/main" id="{2E7C500F-3459-2693-3A4F-6FC81F4F3F65}"/>
+              </a:ext>
+            </a:extLst>
+          </p:cNvPr>
+          <p:cNvSpPr txBox="1"/>
+          <p:nvPr/>
+        </p:nvSpPr>
+        <p:spPr>
+          <a:xfrm>
+            <a:off x="3936671" y="1594139"/>
+            <a:ext cx="621049" cy="261610"/>
+          </a:xfrm>
+          <a:prstGeom prst="rect">
+            <a:avLst/>
+          </a:prstGeom>
+          <a:noFill/>
+        </p:spPr>
+        <p:txBody>
+          <a:bodyPr wrap="square" rtlCol="0">
+            <a:spAutoFit/>
+          </a:bodyPr>
+          <a:lstStyle/>
+          <a:p>
+            <a:r>
+              <a:rPr lang="en-US" sz="1100" b="1" dirty="0"/>
+              <a:t>Input</a:t>
+            </a:r>
+            <a:endParaRPr lang="en-SG" sz="1100" b="1" dirty="0"/>
+          </a:p>
+        </p:txBody>
+      </p:sp>
+      <p:sp>
+        <p:nvSpPr>
+          <p:cNvPr id="81" name="TextBox 80">
+            <a:extLst>
+              <a:ext uri="{FF2B5EF4-FFF2-40B4-BE49-F238E27FC236}">
+                <a16:creationId xmlns:a16="http://schemas.microsoft.com/office/drawing/2014/main" id="{93766AF5-7C12-8CE2-06CF-A65962CCE6F7}"/>
+              </a:ext>
+            </a:extLst>
+          </p:cNvPr>
+          <p:cNvSpPr txBox="1"/>
+          <p:nvPr/>
+        </p:nvSpPr>
+        <p:spPr>
+          <a:xfrm>
+            <a:off x="4428406" y="4695542"/>
+            <a:ext cx="621049" cy="261610"/>
+          </a:xfrm>
+          <a:prstGeom prst="rect">
+            <a:avLst/>
+          </a:prstGeom>
+          <a:noFill/>
+          <a:ln w="28575">
+            <a:noFill/>
+          </a:ln>
+        </p:spPr>
+        <p:txBody>
+          <a:bodyPr wrap="square" rtlCol="0">
+            <a:spAutoFit/>
+          </a:bodyPr>
+          <a:lstStyle/>
+          <a:p>
+            <a:r>
+              <a:rPr lang="en-US" sz="1100" b="1" dirty="0"/>
+              <a:t>Input</a:t>
+            </a:r>
+            <a:endParaRPr lang="en-SG" sz="1100" b="1" dirty="0"/>
+          </a:p>
+        </p:txBody>
+      </p:sp>
+      <p:sp>
+        <p:nvSpPr>
+          <p:cNvPr id="82" name="TextBox 81">
+            <a:extLst>
+              <a:ext uri="{FF2B5EF4-FFF2-40B4-BE49-F238E27FC236}">
+                <a16:creationId xmlns:a16="http://schemas.microsoft.com/office/drawing/2014/main" id="{A9927A30-8533-260A-5226-0B83F96EFF04}"/>
+              </a:ext>
+            </a:extLst>
+          </p:cNvPr>
+          <p:cNvSpPr txBox="1"/>
+          <p:nvPr/>
+        </p:nvSpPr>
+        <p:spPr>
+          <a:xfrm>
+            <a:off x="9717308" y="3394846"/>
+            <a:ext cx="621049" cy="261610"/>
+          </a:xfrm>
+          <a:prstGeom prst="rect">
+            <a:avLst/>
+          </a:prstGeom>
+          <a:noFill/>
+          <a:ln w="28575">
+            <a:noFill/>
+          </a:ln>
+        </p:spPr>
+        <p:txBody>
+          <a:bodyPr wrap="square" rtlCol="0">
+            <a:spAutoFit/>
+          </a:bodyPr>
+          <a:lstStyle/>
+          <a:p>
+            <a:r>
+              <a:rPr lang="en-US" sz="1100" b="1" dirty="0"/>
+              <a:t>output</a:t>
+            </a:r>
+            <a:endParaRPr lang="en-SG" sz="1100" b="1" dirty="0"/>
+          </a:p>
+        </p:txBody>
+      </p:sp>
+      <p:sp>
+        <p:nvSpPr>
+          <p:cNvPr id="83" name="TextBox 82">
+            <a:extLst>
+              <a:ext uri="{FF2B5EF4-FFF2-40B4-BE49-F238E27FC236}">
+                <a16:creationId xmlns:a16="http://schemas.microsoft.com/office/drawing/2014/main" id="{01D40D7C-750D-8CF9-3FCC-20EDE01138DD}"/>
+              </a:ext>
+            </a:extLst>
+          </p:cNvPr>
+          <p:cNvSpPr txBox="1"/>
+          <p:nvPr/>
+        </p:nvSpPr>
+        <p:spPr>
+          <a:xfrm>
+            <a:off x="1763391" y="2994290"/>
+            <a:ext cx="621049" cy="261610"/>
+          </a:xfrm>
+          <a:prstGeom prst="rect">
+            <a:avLst/>
+          </a:prstGeom>
+          <a:noFill/>
+        </p:spPr>
+        <p:txBody>
+          <a:bodyPr wrap="square" rtlCol="0">
+            <a:spAutoFit/>
+          </a:bodyPr>
+          <a:lstStyle/>
+          <a:p>
+            <a:r>
+              <a:rPr lang="en-US" sz="1100" b="1" dirty="0"/>
+              <a:t>output</a:t>
+            </a:r>
+            <a:endParaRPr lang="en-SG" sz="1100" b="1" dirty="0"/>
+          </a:p>
+        </p:txBody>
+      </p:sp>
+      <p:pic>
+        <p:nvPicPr>
+          <p:cNvPr id="5" name="Picture 4" descr="A green rectangular sign with text and images&#10;&#10;Description automatically generated">
+            <a:extLst>
+              <a:ext uri="{FF2B5EF4-FFF2-40B4-BE49-F238E27FC236}">
+                <a16:creationId xmlns:a16="http://schemas.microsoft.com/office/drawing/2014/main" id="{85D0EE79-956A-2710-056B-5128E1B2B000}"/>
+              </a:ext>
+            </a:extLst>
+          </p:cNvPr>
+          <p:cNvPicPr>
+            <a:picLocks noChangeAspect="1"/>
+          </p:cNvPicPr>
+          <p:nvPr/>
+        </p:nvPicPr>
+        <p:blipFill>
+          <a:blip r:embed="rId7">
+            <a:extLst>
+              <a:ext uri="{28A0092B-C50C-407E-A947-70E740481C1C}">
+                <a14:useLocalDpi xmlns:a14="http://schemas.microsoft.com/office/drawing/2010/main" val="0"/>
+              </a:ext>
+            </a:extLst>
+          </a:blip>
+          <a:stretch>
+            <a:fillRect/>
+          </a:stretch>
+        </p:blipFill>
+        <p:spPr>
+          <a:xfrm>
+            <a:off x="8940971" y="1039221"/>
+            <a:ext cx="1870940" cy="1564106"/>
+          </a:xfrm>
+          <a:prstGeom prst="rect">
+            <a:avLst/>
+          </a:prstGeom>
+        </p:spPr>
+      </p:pic>
+      <p:sp>
+        <p:nvSpPr>
+          <p:cNvPr id="6" name="TextBox 5">
+            <a:extLst>
+              <a:ext uri="{FF2B5EF4-FFF2-40B4-BE49-F238E27FC236}">
+                <a16:creationId xmlns:a16="http://schemas.microsoft.com/office/drawing/2014/main" id="{F36028E7-FA53-E0F6-D060-58819B71A7FD}"/>
+              </a:ext>
+            </a:extLst>
+          </p:cNvPr>
+          <p:cNvSpPr txBox="1"/>
+          <p:nvPr/>
+        </p:nvSpPr>
+        <p:spPr>
+          <a:xfrm>
+            <a:off x="3789308" y="499066"/>
+            <a:ext cx="4074304" cy="400110"/>
+          </a:xfrm>
+          <a:prstGeom prst="rect">
+            <a:avLst/>
+          </a:prstGeom>
+          <a:solidFill>
+            <a:schemeClr val="bg1"/>
+          </a:solidFill>
+          <a:ln w="19050">
+            <a:solidFill>
+              <a:schemeClr val="tx1"/>
+            </a:solidFill>
+            <a:prstDash val="sysDash"/>
+          </a:ln>
+        </p:spPr>
+        <p:txBody>
+          <a:bodyPr wrap="square" rtlCol="0">
+            <a:spAutoFit/>
+          </a:bodyPr>
+          <a:lstStyle/>
+          <a:p>
+            <a:r>
+              <a:rPr lang="en-US" sz="2000" b="1" dirty="0"/>
+              <a:t>Python Program Obfuscation Tool</a:t>
+            </a:r>
+            <a:endParaRPr lang="en-SG" sz="2000" b="1" dirty="0"/>
+          </a:p>
+        </p:txBody>
+      </p:sp>
+    </p:spTree>
+    <p:extLst>
+      <p:ext uri="{BB962C8B-B14F-4D97-AF65-F5344CB8AC3E}">
+        <p14:creationId xmlns:p14="http://schemas.microsoft.com/office/powerpoint/2010/main" val="1339588343"/>
+      </p:ext>
+    </p:extLst>
+  </p:cSld>
+  <p:clrMapOvr>
+    <a:masterClrMapping/>
+  </p:clrMapOvr>
+</p:sld>
+</file>
+
+<file path=ppt/slides/slide5.xml><?xml version="1.0" encoding="utf-8"?>
+<p:sld xmlns:a="http://schemas.openxmlformats.org/drawingml/2006/main" xmlns:r="http://schemas.openxmlformats.org/officeDocument/2006/relationships" xmlns:p="http://schemas.openxmlformats.org/presentationml/2006/main">
+  <p:cSld>
+    <p:spTree>
+      <p:nvGrpSpPr>
+        <p:cNvPr id="1" name=""/>
+        <p:cNvGrpSpPr/>
+        <p:nvPr/>
+      </p:nvGrpSpPr>
+      <p:grpSpPr>
+        <a:xfrm>
+          <a:off x="0" y="0"/>
+          <a:ext cx="0" cy="0"/>
+          <a:chOff x="0" y="0"/>
+          <a:chExt cx="0" cy="0"/>
+        </a:xfrm>
+      </p:grpSpPr>
       <p:pic>
         <p:nvPicPr>
           <p:cNvPr id="5" name="Picture 4" descr="A screenshot of a computer program&#10;&#10;Description automatically generated">
@@ -7779,7 +9960,7 @@
 </p:sld>
 </file>
 
-<file path=ppt/slides/slide5.xml><?xml version="1.0" encoding="utf-8"?>
+<file path=ppt/slides/slide6.xml><?xml version="1.0" encoding="utf-8"?>
 <p:sld xmlns:a="http://schemas.openxmlformats.org/drawingml/2006/main" xmlns:r="http://schemas.openxmlformats.org/officeDocument/2006/relationships" xmlns:p="http://schemas.openxmlformats.org/presentationml/2006/main">
   <p:cSld>
     <p:spTree>

</xml_diff>